<commit_message>
Graphics: abstract & Methodology
</commit_message>
<xml_diff>
--- a/PNG/utils/Methodology.pptx
+++ b/PNG/utils/Methodology.pptx
@@ -5,8 +5,7 @@
     <p:sldMasterId id="2147483648" r:id="rId4"/>
   </p:sldMasterIdLst>
   <p:sldIdLst>
-    <p:sldId id="256" r:id="rId5"/>
-    <p:sldId id="257" r:id="rId6"/>
+    <p:sldId id="257" r:id="rId5"/>
   </p:sldIdLst>
   <p:sldSz cx="12192000" cy="6858000"/>
   <p:notesSz cx="6858000" cy="9144000"/>
@@ -117,13 +116,13 @@
 <pc:chgInfo xmlns:a="http://schemas.openxmlformats.org/drawingml/2006/main" xmlns:r="http://schemas.openxmlformats.org/officeDocument/2006/relationships" xmlns:ac="http://schemas.microsoft.com/office/drawing/2013/main/command" xmlns:pc="http://schemas.microsoft.com/office/powerpoint/2013/main/command">
   <pc:docChgLst>
     <pc:chgData name="Isidro Hidalgo Arellano" userId="452e2f9f-e929-4d4b-b574-8d59cce3d23b" providerId="ADAL" clId="{8ACB3643-7406-4F1D-B159-4DB3639EEE10}"/>
-    <pc:docChg chg="undo custSel addSld modSld">
-      <pc:chgData name="Isidro Hidalgo Arellano" userId="452e2f9f-e929-4d4b-b574-8d59cce3d23b" providerId="ADAL" clId="{8ACB3643-7406-4F1D-B159-4DB3639EEE10}" dt="2023-11-02T22:02:14.865" v="802" actId="1582"/>
+    <pc:docChg chg="undo custSel addSld delSld modSld">
+      <pc:chgData name="Isidro Hidalgo Arellano" userId="452e2f9f-e929-4d4b-b574-8d59cce3d23b" providerId="ADAL" clId="{8ACB3643-7406-4F1D-B159-4DB3639EEE10}" dt="2023-11-06T15:38:08.543" v="823" actId="20577"/>
       <pc:docMkLst>
         <pc:docMk/>
       </pc:docMkLst>
-      <pc:sldChg chg="modSp">
-        <pc:chgData name="Isidro Hidalgo Arellano" userId="452e2f9f-e929-4d4b-b574-8d59cce3d23b" providerId="ADAL" clId="{8ACB3643-7406-4F1D-B159-4DB3639EEE10}" dt="2023-11-02T21:40:28.267" v="508"/>
+      <pc:sldChg chg="modSp del">
+        <pc:chgData name="Isidro Hidalgo Arellano" userId="452e2f9f-e929-4d4b-b574-8d59cce3d23b" providerId="ADAL" clId="{8ACB3643-7406-4F1D-B159-4DB3639EEE10}" dt="2023-11-06T15:37:14.235" v="803" actId="2696"/>
         <pc:sldMkLst>
           <pc:docMk/>
           <pc:sldMk cId="1471484158" sldId="256"/>
@@ -138,7 +137,7 @@
         </pc:graphicFrameChg>
       </pc:sldChg>
       <pc:sldChg chg="addSp delSp modSp add">
-        <pc:chgData name="Isidro Hidalgo Arellano" userId="452e2f9f-e929-4d4b-b574-8d59cce3d23b" providerId="ADAL" clId="{8ACB3643-7406-4F1D-B159-4DB3639EEE10}" dt="2023-11-02T22:02:14.865" v="802" actId="1582"/>
+        <pc:chgData name="Isidro Hidalgo Arellano" userId="452e2f9f-e929-4d4b-b574-8d59cce3d23b" providerId="ADAL" clId="{8ACB3643-7406-4F1D-B159-4DB3639EEE10}" dt="2023-11-06T15:38:08.543" v="823" actId="20577"/>
         <pc:sldMkLst>
           <pc:docMk/>
           <pc:sldMk cId="1780148037" sldId="257"/>
@@ -152,7 +151,7 @@
           </ac:spMkLst>
         </pc:spChg>
         <pc:spChg chg="add mod">
-          <ac:chgData name="Isidro Hidalgo Arellano" userId="452e2f9f-e929-4d4b-b574-8d59cce3d23b" providerId="ADAL" clId="{8ACB3643-7406-4F1D-B159-4DB3639EEE10}" dt="2023-11-02T21:56:51.264" v="655" actId="6549"/>
+          <ac:chgData name="Isidro Hidalgo Arellano" userId="452e2f9f-e929-4d4b-b574-8d59cce3d23b" providerId="ADAL" clId="{8ACB3643-7406-4F1D-B159-4DB3639EEE10}" dt="2023-11-06T15:37:24.595" v="809" actId="20577"/>
           <ac:spMkLst>
             <pc:docMk/>
             <pc:sldMk cId="1780148037" sldId="257"/>
@@ -160,7 +159,7 @@
           </ac:spMkLst>
         </pc:spChg>
         <pc:spChg chg="add mod">
-          <ac:chgData name="Isidro Hidalgo Arellano" userId="452e2f9f-e929-4d4b-b574-8d59cce3d23b" providerId="ADAL" clId="{8ACB3643-7406-4F1D-B159-4DB3639EEE10}" dt="2023-11-02T22:02:02.066" v="800" actId="1582"/>
+          <ac:chgData name="Isidro Hidalgo Arellano" userId="452e2f9f-e929-4d4b-b574-8d59cce3d23b" providerId="ADAL" clId="{8ACB3643-7406-4F1D-B159-4DB3639EEE10}" dt="2023-11-06T15:37:30.346" v="812" actId="20577"/>
           <ac:spMkLst>
             <pc:docMk/>
             <pc:sldMk cId="1780148037" sldId="257"/>
@@ -168,7 +167,7 @@
           </ac:spMkLst>
         </pc:spChg>
         <pc:spChg chg="add mod">
-          <ac:chgData name="Isidro Hidalgo Arellano" userId="452e2f9f-e929-4d4b-b574-8d59cce3d23b" providerId="ADAL" clId="{8ACB3643-7406-4F1D-B159-4DB3639EEE10}" dt="2023-11-02T22:02:02.066" v="800" actId="1582"/>
+          <ac:chgData name="Isidro Hidalgo Arellano" userId="452e2f9f-e929-4d4b-b574-8d59cce3d23b" providerId="ADAL" clId="{8ACB3643-7406-4F1D-B159-4DB3639EEE10}" dt="2023-11-06T15:38:08.543" v="823" actId="20577"/>
           <ac:spMkLst>
             <pc:docMk/>
             <pc:sldMk cId="1780148037" sldId="257"/>
@@ -176,7 +175,7 @@
           </ac:spMkLst>
         </pc:spChg>
         <pc:spChg chg="add mod">
-          <ac:chgData name="Isidro Hidalgo Arellano" userId="452e2f9f-e929-4d4b-b574-8d59cce3d23b" providerId="ADAL" clId="{8ACB3643-7406-4F1D-B159-4DB3639EEE10}" dt="2023-11-02T22:02:08.738" v="801" actId="1582"/>
+          <ac:chgData name="Isidro Hidalgo Arellano" userId="452e2f9f-e929-4d4b-b574-8d59cce3d23b" providerId="ADAL" clId="{8ACB3643-7406-4F1D-B159-4DB3639EEE10}" dt="2023-11-06T15:37:41.396" v="818" actId="20577"/>
           <ac:spMkLst>
             <pc:docMk/>
             <pc:sldMk cId="1780148037" sldId="257"/>
@@ -192,7 +191,7 @@
           </ac:spMkLst>
         </pc:spChg>
         <pc:spChg chg="add mod">
-          <ac:chgData name="Isidro Hidalgo Arellano" userId="452e2f9f-e929-4d4b-b574-8d59cce3d23b" providerId="ADAL" clId="{8ACB3643-7406-4F1D-B159-4DB3639EEE10}" dt="2023-11-02T21:56:32.151" v="637" actId="782"/>
+          <ac:chgData name="Isidro Hidalgo Arellano" userId="452e2f9f-e929-4d4b-b574-8d59cce3d23b" providerId="ADAL" clId="{8ACB3643-7406-4F1D-B159-4DB3639EEE10}" dt="2023-11-06T15:37:19.107" v="806" actId="20577"/>
           <ac:spMkLst>
             <pc:docMk/>
             <pc:sldMk cId="1780148037" sldId="257"/>
@@ -200,7 +199,7 @@
           </ac:spMkLst>
         </pc:spChg>
         <pc:spChg chg="add mod">
-          <ac:chgData name="Isidro Hidalgo Arellano" userId="452e2f9f-e929-4d4b-b574-8d59cce3d23b" providerId="ADAL" clId="{8ACB3643-7406-4F1D-B159-4DB3639EEE10}" dt="2023-11-02T22:02:08.738" v="801" actId="1582"/>
+          <ac:chgData name="Isidro Hidalgo Arellano" userId="452e2f9f-e929-4d4b-b574-8d59cce3d23b" providerId="ADAL" clId="{8ACB3643-7406-4F1D-B159-4DB3639EEE10}" dt="2023-11-06T15:37:45.629" v="821" actId="20577"/>
           <ac:spMkLst>
             <pc:docMk/>
             <pc:sldMk cId="1780148037" sldId="257"/>
@@ -211,3435 +210,6 @@
     </pc:docChg>
   </pc:docChgLst>
 </pc:chgInfo>
-</file>
-
-<file path=ppt/diagrams/colors1.xml><?xml version="1.0" encoding="utf-8"?>
-<dgm:colorsDef xmlns:dgm="http://schemas.openxmlformats.org/drawingml/2006/diagram" xmlns:a="http://schemas.openxmlformats.org/drawingml/2006/main" uniqueId="urn:microsoft.com/office/officeart/2005/8/colors/accent1_2">
-  <dgm:title val=""/>
-  <dgm:desc val=""/>
-  <dgm:catLst>
-    <dgm:cat type="accent1" pri="11200"/>
-  </dgm:catLst>
-  <dgm:styleLbl name="node0">
-    <dgm:fillClrLst meth="repeat">
-      <a:schemeClr val="accent1"/>
-    </dgm:fillClrLst>
-    <dgm:linClrLst meth="repeat">
-      <a:schemeClr val="lt1"/>
-    </dgm:linClrLst>
-    <dgm:effectClrLst/>
-    <dgm:txLinClrLst/>
-    <dgm:txFillClrLst/>
-    <dgm:txEffectClrLst/>
-  </dgm:styleLbl>
-  <dgm:styleLbl name="alignNode1">
-    <dgm:fillClrLst meth="repeat">
-      <a:schemeClr val="accent1"/>
-    </dgm:fillClrLst>
-    <dgm:linClrLst meth="repeat">
-      <a:schemeClr val="accent1"/>
-    </dgm:linClrLst>
-    <dgm:effectClrLst/>
-    <dgm:txLinClrLst/>
-    <dgm:txFillClrLst/>
-    <dgm:txEffectClrLst/>
-  </dgm:styleLbl>
-  <dgm:styleLbl name="node1">
-    <dgm:fillClrLst meth="repeat">
-      <a:schemeClr val="accent1"/>
-    </dgm:fillClrLst>
-    <dgm:linClrLst meth="repeat">
-      <a:schemeClr val="lt1"/>
-    </dgm:linClrLst>
-    <dgm:effectClrLst/>
-    <dgm:txLinClrLst/>
-    <dgm:txFillClrLst/>
-    <dgm:txEffectClrLst/>
-  </dgm:styleLbl>
-  <dgm:styleLbl name="lnNode1">
-    <dgm:fillClrLst meth="repeat">
-      <a:schemeClr val="accent1"/>
-    </dgm:fillClrLst>
-    <dgm:linClrLst meth="repeat">
-      <a:schemeClr val="lt1"/>
-    </dgm:linClrLst>
-    <dgm:effectClrLst/>
-    <dgm:txLinClrLst/>
-    <dgm:txFillClrLst/>
-    <dgm:txEffectClrLst/>
-  </dgm:styleLbl>
-  <dgm:styleLbl name="vennNode1">
-    <dgm:fillClrLst meth="repeat">
-      <a:schemeClr val="accent1">
-        <a:alpha val="50000"/>
-      </a:schemeClr>
-    </dgm:fillClrLst>
-    <dgm:linClrLst meth="repeat">
-      <a:schemeClr val="lt1"/>
-    </dgm:linClrLst>
-    <dgm:effectClrLst/>
-    <dgm:txLinClrLst/>
-    <dgm:txFillClrLst/>
-    <dgm:txEffectClrLst/>
-  </dgm:styleLbl>
-  <dgm:styleLbl name="node2">
-    <dgm:fillClrLst meth="repeat">
-      <a:schemeClr val="accent1"/>
-    </dgm:fillClrLst>
-    <dgm:linClrLst meth="repeat">
-      <a:schemeClr val="lt1"/>
-    </dgm:linClrLst>
-    <dgm:effectClrLst/>
-    <dgm:txLinClrLst/>
-    <dgm:txFillClrLst/>
-    <dgm:txEffectClrLst/>
-  </dgm:styleLbl>
-  <dgm:styleLbl name="node3">
-    <dgm:fillClrLst meth="repeat">
-      <a:schemeClr val="accent1"/>
-    </dgm:fillClrLst>
-    <dgm:linClrLst meth="repeat">
-      <a:schemeClr val="lt1"/>
-    </dgm:linClrLst>
-    <dgm:effectClrLst/>
-    <dgm:txLinClrLst/>
-    <dgm:txFillClrLst/>
-    <dgm:txEffectClrLst/>
-  </dgm:styleLbl>
-  <dgm:styleLbl name="node4">
-    <dgm:fillClrLst meth="repeat">
-      <a:schemeClr val="accent1"/>
-    </dgm:fillClrLst>
-    <dgm:linClrLst meth="repeat">
-      <a:schemeClr val="lt1"/>
-    </dgm:linClrLst>
-    <dgm:effectClrLst/>
-    <dgm:txLinClrLst/>
-    <dgm:txFillClrLst/>
-    <dgm:txEffectClrLst/>
-  </dgm:styleLbl>
-  <dgm:styleLbl name="fgImgPlace1">
-    <dgm:fillClrLst meth="repeat">
-      <a:schemeClr val="accent1">
-        <a:tint val="50000"/>
-      </a:schemeClr>
-    </dgm:fillClrLst>
-    <dgm:linClrLst meth="repeat">
-      <a:schemeClr val="lt1"/>
-    </dgm:linClrLst>
-    <dgm:effectClrLst/>
-    <dgm:txLinClrLst/>
-    <dgm:txFillClrLst meth="repeat">
-      <a:schemeClr val="lt1"/>
-    </dgm:txFillClrLst>
-    <dgm:txEffectClrLst/>
-  </dgm:styleLbl>
-  <dgm:styleLbl name="alignImgPlace1">
-    <dgm:fillClrLst meth="repeat">
-      <a:schemeClr val="accent1">
-        <a:tint val="50000"/>
-      </a:schemeClr>
-    </dgm:fillClrLst>
-    <dgm:linClrLst meth="repeat">
-      <a:schemeClr val="lt1"/>
-    </dgm:linClrLst>
-    <dgm:effectClrLst/>
-    <dgm:txLinClrLst/>
-    <dgm:txFillClrLst meth="repeat">
-      <a:schemeClr val="lt1"/>
-    </dgm:txFillClrLst>
-    <dgm:txEffectClrLst/>
-  </dgm:styleLbl>
-  <dgm:styleLbl name="bgImgPlace1">
-    <dgm:fillClrLst meth="repeat">
-      <a:schemeClr val="accent1">
-        <a:tint val="50000"/>
-      </a:schemeClr>
-    </dgm:fillClrLst>
-    <dgm:linClrLst meth="repeat">
-      <a:schemeClr val="lt1"/>
-    </dgm:linClrLst>
-    <dgm:effectClrLst/>
-    <dgm:txLinClrLst/>
-    <dgm:txFillClrLst meth="repeat">
-      <a:schemeClr val="lt1"/>
-    </dgm:txFillClrLst>
-    <dgm:txEffectClrLst/>
-  </dgm:styleLbl>
-  <dgm:styleLbl name="sibTrans2D1">
-    <dgm:fillClrLst meth="repeat">
-      <a:schemeClr val="accent1">
-        <a:tint val="60000"/>
-      </a:schemeClr>
-    </dgm:fillClrLst>
-    <dgm:linClrLst meth="repeat">
-      <a:schemeClr val="accent1">
-        <a:tint val="60000"/>
-      </a:schemeClr>
-    </dgm:linClrLst>
-    <dgm:effectClrLst/>
-    <dgm:txLinClrLst/>
-    <dgm:txFillClrLst/>
-    <dgm:txEffectClrLst/>
-  </dgm:styleLbl>
-  <dgm:styleLbl name="fgSibTrans2D1">
-    <dgm:fillClrLst meth="repeat">
-      <a:schemeClr val="accent1">
-        <a:tint val="60000"/>
-      </a:schemeClr>
-    </dgm:fillClrLst>
-    <dgm:linClrLst meth="repeat">
-      <a:schemeClr val="accent1">
-        <a:tint val="60000"/>
-      </a:schemeClr>
-    </dgm:linClrLst>
-    <dgm:effectClrLst/>
-    <dgm:txLinClrLst/>
-    <dgm:txFillClrLst/>
-    <dgm:txEffectClrLst/>
-  </dgm:styleLbl>
-  <dgm:styleLbl name="bgSibTrans2D1">
-    <dgm:fillClrLst meth="repeat">
-      <a:schemeClr val="accent1">
-        <a:tint val="60000"/>
-      </a:schemeClr>
-    </dgm:fillClrLst>
-    <dgm:linClrLst meth="repeat">
-      <a:schemeClr val="accent1">
-        <a:tint val="60000"/>
-      </a:schemeClr>
-    </dgm:linClrLst>
-    <dgm:effectClrLst/>
-    <dgm:txLinClrLst/>
-    <dgm:txFillClrLst/>
-    <dgm:txEffectClrLst/>
-  </dgm:styleLbl>
-  <dgm:styleLbl name="sibTrans1D1">
-    <dgm:fillClrLst meth="repeat">
-      <a:schemeClr val="accent1"/>
-    </dgm:fillClrLst>
-    <dgm:linClrLst meth="repeat">
-      <a:schemeClr val="accent1"/>
-    </dgm:linClrLst>
-    <dgm:effectClrLst/>
-    <dgm:txLinClrLst/>
-    <dgm:txFillClrLst meth="repeat">
-      <a:schemeClr val="tx1"/>
-    </dgm:txFillClrLst>
-    <dgm:txEffectClrLst/>
-  </dgm:styleLbl>
-  <dgm:styleLbl name="callout">
-    <dgm:fillClrLst meth="repeat">
-      <a:schemeClr val="accent1"/>
-    </dgm:fillClrLst>
-    <dgm:linClrLst meth="repeat">
-      <a:schemeClr val="accent1">
-        <a:tint val="50000"/>
-      </a:schemeClr>
-    </dgm:linClrLst>
-    <dgm:effectClrLst/>
-    <dgm:txLinClrLst/>
-    <dgm:txFillClrLst meth="repeat">
-      <a:schemeClr val="tx1"/>
-    </dgm:txFillClrLst>
-    <dgm:txEffectClrLst/>
-  </dgm:styleLbl>
-  <dgm:styleLbl name="asst0">
-    <dgm:fillClrLst meth="repeat">
-      <a:schemeClr val="accent1"/>
-    </dgm:fillClrLst>
-    <dgm:linClrLst meth="repeat">
-      <a:schemeClr val="lt1"/>
-    </dgm:linClrLst>
-    <dgm:effectClrLst/>
-    <dgm:txLinClrLst/>
-    <dgm:txFillClrLst/>
-    <dgm:txEffectClrLst/>
-  </dgm:styleLbl>
-  <dgm:styleLbl name="asst1">
-    <dgm:fillClrLst meth="repeat">
-      <a:schemeClr val="accent1"/>
-    </dgm:fillClrLst>
-    <dgm:linClrLst meth="repeat">
-      <a:schemeClr val="lt1"/>
-    </dgm:linClrLst>
-    <dgm:effectClrLst/>
-    <dgm:txLinClrLst/>
-    <dgm:txFillClrLst/>
-    <dgm:txEffectClrLst/>
-  </dgm:styleLbl>
-  <dgm:styleLbl name="asst2">
-    <dgm:fillClrLst meth="repeat">
-      <a:schemeClr val="accent1"/>
-    </dgm:fillClrLst>
-    <dgm:linClrLst meth="repeat">
-      <a:schemeClr val="lt1"/>
-    </dgm:linClrLst>
-    <dgm:effectClrLst/>
-    <dgm:txLinClrLst/>
-    <dgm:txFillClrLst/>
-    <dgm:txEffectClrLst/>
-  </dgm:styleLbl>
-  <dgm:styleLbl name="asst3">
-    <dgm:fillClrLst meth="repeat">
-      <a:schemeClr val="accent1"/>
-    </dgm:fillClrLst>
-    <dgm:linClrLst meth="repeat">
-      <a:schemeClr val="lt1"/>
-    </dgm:linClrLst>
-    <dgm:effectClrLst/>
-    <dgm:txLinClrLst/>
-    <dgm:txFillClrLst/>
-    <dgm:txEffectClrLst/>
-  </dgm:styleLbl>
-  <dgm:styleLbl name="asst4">
-    <dgm:fillClrLst meth="repeat">
-      <a:schemeClr val="accent1"/>
-    </dgm:fillClrLst>
-    <dgm:linClrLst meth="repeat">
-      <a:schemeClr val="lt1"/>
-    </dgm:linClrLst>
-    <dgm:effectClrLst/>
-    <dgm:txLinClrLst/>
-    <dgm:txFillClrLst/>
-    <dgm:txEffectClrLst/>
-  </dgm:styleLbl>
-  <dgm:styleLbl name="parChTrans2D1">
-    <dgm:fillClrLst meth="repeat">
-      <a:schemeClr val="accent1">
-        <a:tint val="60000"/>
-      </a:schemeClr>
-    </dgm:fillClrLst>
-    <dgm:linClrLst meth="repeat">
-      <a:schemeClr val="accent1">
-        <a:tint val="60000"/>
-      </a:schemeClr>
-    </dgm:linClrLst>
-    <dgm:effectClrLst/>
-    <dgm:txLinClrLst/>
-    <dgm:txFillClrLst meth="repeat">
-      <a:schemeClr val="lt1"/>
-    </dgm:txFillClrLst>
-    <dgm:txEffectClrLst/>
-  </dgm:styleLbl>
-  <dgm:styleLbl name="parChTrans2D2">
-    <dgm:fillClrLst meth="repeat">
-      <a:schemeClr val="accent1"/>
-    </dgm:fillClrLst>
-    <dgm:linClrLst meth="repeat">
-      <a:schemeClr val="accent1"/>
-    </dgm:linClrLst>
-    <dgm:effectClrLst/>
-    <dgm:txLinClrLst/>
-    <dgm:txFillClrLst meth="repeat">
-      <a:schemeClr val="lt1"/>
-    </dgm:txFillClrLst>
-    <dgm:txEffectClrLst/>
-  </dgm:styleLbl>
-  <dgm:styleLbl name="parChTrans2D3">
-    <dgm:fillClrLst meth="repeat">
-      <a:schemeClr val="accent1"/>
-    </dgm:fillClrLst>
-    <dgm:linClrLst meth="repeat">
-      <a:schemeClr val="accent1"/>
-    </dgm:linClrLst>
-    <dgm:effectClrLst/>
-    <dgm:txLinClrLst/>
-    <dgm:txFillClrLst meth="repeat">
-      <a:schemeClr val="lt1"/>
-    </dgm:txFillClrLst>
-    <dgm:txEffectClrLst/>
-  </dgm:styleLbl>
-  <dgm:styleLbl name="parChTrans2D4">
-    <dgm:fillClrLst meth="repeat">
-      <a:schemeClr val="accent1"/>
-    </dgm:fillClrLst>
-    <dgm:linClrLst meth="repeat">
-      <a:schemeClr val="accent1"/>
-    </dgm:linClrLst>
-    <dgm:effectClrLst/>
-    <dgm:txLinClrLst/>
-    <dgm:txFillClrLst meth="repeat">
-      <a:schemeClr val="lt1"/>
-    </dgm:txFillClrLst>
-    <dgm:txEffectClrLst/>
-  </dgm:styleLbl>
-  <dgm:styleLbl name="parChTrans1D1">
-    <dgm:fillClrLst meth="repeat">
-      <a:schemeClr val="accent1"/>
-    </dgm:fillClrLst>
-    <dgm:linClrLst meth="repeat">
-      <a:schemeClr val="accent1">
-        <a:shade val="60000"/>
-      </a:schemeClr>
-    </dgm:linClrLst>
-    <dgm:effectClrLst/>
-    <dgm:txLinClrLst/>
-    <dgm:txFillClrLst meth="repeat">
-      <a:schemeClr val="tx1"/>
-    </dgm:txFillClrLst>
-    <dgm:txEffectClrLst/>
-  </dgm:styleLbl>
-  <dgm:styleLbl name="parChTrans1D2">
-    <dgm:fillClrLst meth="repeat">
-      <a:schemeClr val="accent1"/>
-    </dgm:fillClrLst>
-    <dgm:linClrLst meth="repeat">
-      <a:schemeClr val="accent1">
-        <a:shade val="60000"/>
-      </a:schemeClr>
-    </dgm:linClrLst>
-    <dgm:effectClrLst/>
-    <dgm:txLinClrLst/>
-    <dgm:txFillClrLst meth="repeat">
-      <a:schemeClr val="tx1"/>
-    </dgm:txFillClrLst>
-    <dgm:txEffectClrLst/>
-  </dgm:styleLbl>
-  <dgm:styleLbl name="parChTrans1D3">
-    <dgm:fillClrLst meth="repeat">
-      <a:schemeClr val="accent1"/>
-    </dgm:fillClrLst>
-    <dgm:linClrLst meth="repeat">
-      <a:schemeClr val="accent1">
-        <a:shade val="80000"/>
-      </a:schemeClr>
-    </dgm:linClrLst>
-    <dgm:effectClrLst/>
-    <dgm:txLinClrLst/>
-    <dgm:txFillClrLst meth="repeat">
-      <a:schemeClr val="tx1"/>
-    </dgm:txFillClrLst>
-    <dgm:txEffectClrLst/>
-  </dgm:styleLbl>
-  <dgm:styleLbl name="parChTrans1D4">
-    <dgm:fillClrLst meth="repeat">
-      <a:schemeClr val="accent1"/>
-    </dgm:fillClrLst>
-    <dgm:linClrLst meth="repeat">
-      <a:schemeClr val="accent1">
-        <a:shade val="80000"/>
-      </a:schemeClr>
-    </dgm:linClrLst>
-    <dgm:effectClrLst/>
-    <dgm:txLinClrLst/>
-    <dgm:txFillClrLst meth="repeat">
-      <a:schemeClr val="tx1"/>
-    </dgm:txFillClrLst>
-    <dgm:txEffectClrLst/>
-  </dgm:styleLbl>
-  <dgm:styleLbl name="fgAcc1">
-    <dgm:fillClrLst meth="repeat">
-      <a:schemeClr val="lt1">
-        <a:alpha val="90000"/>
-      </a:schemeClr>
-    </dgm:fillClrLst>
-    <dgm:linClrLst meth="repeat">
-      <a:schemeClr val="accent1"/>
-    </dgm:linClrLst>
-    <dgm:effectClrLst/>
-    <dgm:txLinClrLst/>
-    <dgm:txFillClrLst meth="repeat">
-      <a:schemeClr val="dk1"/>
-    </dgm:txFillClrLst>
-    <dgm:txEffectClrLst/>
-  </dgm:styleLbl>
-  <dgm:styleLbl name="conFgAcc1">
-    <dgm:fillClrLst meth="repeat">
-      <a:schemeClr val="lt1">
-        <a:alpha val="90000"/>
-      </a:schemeClr>
-    </dgm:fillClrLst>
-    <dgm:linClrLst meth="repeat">
-      <a:schemeClr val="accent1"/>
-    </dgm:linClrLst>
-    <dgm:effectClrLst/>
-    <dgm:txLinClrLst/>
-    <dgm:txFillClrLst meth="repeat">
-      <a:schemeClr val="dk1"/>
-    </dgm:txFillClrLst>
-    <dgm:txEffectClrLst/>
-  </dgm:styleLbl>
-  <dgm:styleLbl name="alignAcc1">
-    <dgm:fillClrLst meth="repeat">
-      <a:schemeClr val="lt1">
-        <a:alpha val="90000"/>
-      </a:schemeClr>
-    </dgm:fillClrLst>
-    <dgm:linClrLst meth="repeat">
-      <a:schemeClr val="accent1"/>
-    </dgm:linClrLst>
-    <dgm:effectClrLst/>
-    <dgm:txLinClrLst/>
-    <dgm:txFillClrLst meth="repeat">
-      <a:schemeClr val="dk1"/>
-    </dgm:txFillClrLst>
-    <dgm:txEffectClrLst/>
-  </dgm:styleLbl>
-  <dgm:styleLbl name="trAlignAcc1">
-    <dgm:fillClrLst meth="repeat">
-      <a:schemeClr val="lt1">
-        <a:alpha val="40000"/>
-      </a:schemeClr>
-    </dgm:fillClrLst>
-    <dgm:linClrLst meth="repeat">
-      <a:schemeClr val="accent1"/>
-    </dgm:linClrLst>
-    <dgm:effectClrLst/>
-    <dgm:txLinClrLst/>
-    <dgm:txFillClrLst meth="repeat">
-      <a:schemeClr val="dk1"/>
-    </dgm:txFillClrLst>
-    <dgm:txEffectClrLst/>
-  </dgm:styleLbl>
-  <dgm:styleLbl name="bgAcc1">
-    <dgm:fillClrLst meth="repeat">
-      <a:schemeClr val="lt1">
-        <a:alpha val="90000"/>
-      </a:schemeClr>
-    </dgm:fillClrLst>
-    <dgm:linClrLst meth="repeat">
-      <a:schemeClr val="accent1"/>
-    </dgm:linClrLst>
-    <dgm:effectClrLst/>
-    <dgm:txLinClrLst/>
-    <dgm:txFillClrLst meth="repeat">
-      <a:schemeClr val="dk1"/>
-    </dgm:txFillClrLst>
-    <dgm:txEffectClrLst/>
-  </dgm:styleLbl>
-  <dgm:styleLbl name="solidFgAcc1">
-    <dgm:fillClrLst meth="repeat">
-      <a:schemeClr val="lt1"/>
-    </dgm:fillClrLst>
-    <dgm:linClrLst meth="repeat">
-      <a:schemeClr val="accent1"/>
-    </dgm:linClrLst>
-    <dgm:effectClrLst/>
-    <dgm:txLinClrLst/>
-    <dgm:txFillClrLst meth="repeat">
-      <a:schemeClr val="dk1"/>
-    </dgm:txFillClrLst>
-    <dgm:txEffectClrLst/>
-  </dgm:styleLbl>
-  <dgm:styleLbl name="solidAlignAcc1">
-    <dgm:fillClrLst meth="repeat">
-      <a:schemeClr val="lt1"/>
-    </dgm:fillClrLst>
-    <dgm:linClrLst meth="repeat">
-      <a:schemeClr val="accent1"/>
-    </dgm:linClrLst>
-    <dgm:effectClrLst/>
-    <dgm:txLinClrLst/>
-    <dgm:txFillClrLst meth="repeat">
-      <a:schemeClr val="dk1"/>
-    </dgm:txFillClrLst>
-    <dgm:txEffectClrLst/>
-  </dgm:styleLbl>
-  <dgm:styleLbl name="solidBgAcc1">
-    <dgm:fillClrLst meth="repeat">
-      <a:schemeClr val="lt1"/>
-    </dgm:fillClrLst>
-    <dgm:linClrLst meth="repeat">
-      <a:schemeClr val="accent1"/>
-    </dgm:linClrLst>
-    <dgm:effectClrLst/>
-    <dgm:txLinClrLst/>
-    <dgm:txFillClrLst meth="repeat">
-      <a:schemeClr val="dk1"/>
-    </dgm:txFillClrLst>
-    <dgm:txEffectClrLst/>
-  </dgm:styleLbl>
-  <dgm:styleLbl name="fgAccFollowNode1">
-    <dgm:fillClrLst meth="repeat">
-      <a:schemeClr val="accent1">
-        <a:alpha val="90000"/>
-        <a:tint val="40000"/>
-      </a:schemeClr>
-    </dgm:fillClrLst>
-    <dgm:linClrLst meth="repeat">
-      <a:schemeClr val="accent1">
-        <a:alpha val="90000"/>
-        <a:tint val="40000"/>
-      </a:schemeClr>
-    </dgm:linClrLst>
-    <dgm:effectClrLst/>
-    <dgm:txLinClrLst/>
-    <dgm:txFillClrLst meth="repeat">
-      <a:schemeClr val="dk1"/>
-    </dgm:txFillClrLst>
-    <dgm:txEffectClrLst/>
-  </dgm:styleLbl>
-  <dgm:styleLbl name="alignAccFollowNode1">
-    <dgm:fillClrLst meth="repeat">
-      <a:schemeClr val="accent1">
-        <a:alpha val="90000"/>
-        <a:tint val="40000"/>
-      </a:schemeClr>
-    </dgm:fillClrLst>
-    <dgm:linClrLst meth="repeat">
-      <a:schemeClr val="accent1">
-        <a:alpha val="90000"/>
-        <a:tint val="40000"/>
-      </a:schemeClr>
-    </dgm:linClrLst>
-    <dgm:effectClrLst/>
-    <dgm:txLinClrLst/>
-    <dgm:txFillClrLst meth="repeat">
-      <a:schemeClr val="dk1"/>
-    </dgm:txFillClrLst>
-    <dgm:txEffectClrLst/>
-  </dgm:styleLbl>
-  <dgm:styleLbl name="bgAccFollowNode1">
-    <dgm:fillClrLst meth="repeat">
-      <a:schemeClr val="accent1">
-        <a:alpha val="90000"/>
-        <a:tint val="40000"/>
-      </a:schemeClr>
-    </dgm:fillClrLst>
-    <dgm:linClrLst meth="repeat">
-      <a:schemeClr val="accent1">
-        <a:alpha val="90000"/>
-        <a:tint val="40000"/>
-      </a:schemeClr>
-    </dgm:linClrLst>
-    <dgm:effectClrLst/>
-    <dgm:txLinClrLst/>
-    <dgm:txFillClrLst meth="repeat">
-      <a:schemeClr val="dk1"/>
-    </dgm:txFillClrLst>
-    <dgm:txEffectClrLst/>
-  </dgm:styleLbl>
-  <dgm:styleLbl name="fgAcc0">
-    <dgm:fillClrLst meth="repeat">
-      <a:schemeClr val="lt1">
-        <a:alpha val="90000"/>
-      </a:schemeClr>
-    </dgm:fillClrLst>
-    <dgm:linClrLst meth="repeat">
-      <a:schemeClr val="accent1"/>
-    </dgm:linClrLst>
-    <dgm:effectClrLst/>
-    <dgm:txLinClrLst/>
-    <dgm:txFillClrLst meth="repeat">
-      <a:schemeClr val="dk1"/>
-    </dgm:txFillClrLst>
-    <dgm:txEffectClrLst/>
-  </dgm:styleLbl>
-  <dgm:styleLbl name="fgAcc2">
-    <dgm:fillClrLst meth="repeat">
-      <a:schemeClr val="lt1">
-        <a:alpha val="90000"/>
-      </a:schemeClr>
-    </dgm:fillClrLst>
-    <dgm:linClrLst meth="repeat">
-      <a:schemeClr val="accent1"/>
-    </dgm:linClrLst>
-    <dgm:effectClrLst/>
-    <dgm:txLinClrLst/>
-    <dgm:txFillClrLst meth="repeat">
-      <a:schemeClr val="dk1"/>
-    </dgm:txFillClrLst>
-    <dgm:txEffectClrLst/>
-  </dgm:styleLbl>
-  <dgm:styleLbl name="fgAcc3">
-    <dgm:fillClrLst meth="repeat">
-      <a:schemeClr val="lt1">
-        <a:alpha val="90000"/>
-      </a:schemeClr>
-    </dgm:fillClrLst>
-    <dgm:linClrLst meth="repeat">
-      <a:schemeClr val="accent1"/>
-    </dgm:linClrLst>
-    <dgm:effectClrLst/>
-    <dgm:txLinClrLst/>
-    <dgm:txFillClrLst meth="repeat">
-      <a:schemeClr val="dk1"/>
-    </dgm:txFillClrLst>
-    <dgm:txEffectClrLst/>
-  </dgm:styleLbl>
-  <dgm:styleLbl name="fgAcc4">
-    <dgm:fillClrLst meth="repeat">
-      <a:schemeClr val="lt1">
-        <a:alpha val="90000"/>
-      </a:schemeClr>
-    </dgm:fillClrLst>
-    <dgm:linClrLst meth="repeat">
-      <a:schemeClr val="accent1"/>
-    </dgm:linClrLst>
-    <dgm:effectClrLst/>
-    <dgm:txLinClrLst/>
-    <dgm:txFillClrLst meth="repeat">
-      <a:schemeClr val="dk1"/>
-    </dgm:txFillClrLst>
-    <dgm:txEffectClrLst/>
-  </dgm:styleLbl>
-  <dgm:styleLbl name="bgShp">
-    <dgm:fillClrLst meth="repeat">
-      <a:schemeClr val="accent1">
-        <a:tint val="40000"/>
-      </a:schemeClr>
-    </dgm:fillClrLst>
-    <dgm:linClrLst meth="repeat">
-      <a:schemeClr val="accent1"/>
-    </dgm:linClrLst>
-    <dgm:effectClrLst/>
-    <dgm:txLinClrLst/>
-    <dgm:txFillClrLst meth="repeat">
-      <a:schemeClr val="dk1"/>
-    </dgm:txFillClrLst>
-    <dgm:txEffectClrLst/>
-  </dgm:styleLbl>
-  <dgm:styleLbl name="dkBgShp">
-    <dgm:fillClrLst meth="repeat">
-      <a:schemeClr val="accent1">
-        <a:shade val="80000"/>
-      </a:schemeClr>
-    </dgm:fillClrLst>
-    <dgm:linClrLst meth="repeat">
-      <a:schemeClr val="accent1"/>
-    </dgm:linClrLst>
-    <dgm:effectClrLst/>
-    <dgm:txLinClrLst/>
-    <dgm:txFillClrLst meth="repeat">
-      <a:schemeClr val="lt1"/>
-    </dgm:txFillClrLst>
-    <dgm:txEffectClrLst/>
-  </dgm:styleLbl>
-  <dgm:styleLbl name="trBgShp">
-    <dgm:fillClrLst meth="repeat">
-      <a:schemeClr val="accent1">
-        <a:tint val="50000"/>
-        <a:alpha val="40000"/>
-      </a:schemeClr>
-    </dgm:fillClrLst>
-    <dgm:linClrLst meth="repeat">
-      <a:schemeClr val="accent1"/>
-    </dgm:linClrLst>
-    <dgm:effectClrLst/>
-    <dgm:txLinClrLst/>
-    <dgm:txFillClrLst meth="repeat">
-      <a:schemeClr val="lt1"/>
-    </dgm:txFillClrLst>
-    <dgm:txEffectClrLst/>
-  </dgm:styleLbl>
-  <dgm:styleLbl name="fgShp">
-    <dgm:fillClrLst meth="repeat">
-      <a:schemeClr val="accent1">
-        <a:tint val="60000"/>
-      </a:schemeClr>
-    </dgm:fillClrLst>
-    <dgm:linClrLst meth="repeat">
-      <a:schemeClr val="lt1"/>
-    </dgm:linClrLst>
-    <dgm:effectClrLst/>
-    <dgm:txLinClrLst/>
-    <dgm:txFillClrLst meth="repeat">
-      <a:schemeClr val="dk1"/>
-    </dgm:txFillClrLst>
-    <dgm:txEffectClrLst/>
-  </dgm:styleLbl>
-  <dgm:styleLbl name="revTx">
-    <dgm:fillClrLst meth="repeat">
-      <a:schemeClr val="lt1">
-        <a:alpha val="0"/>
-      </a:schemeClr>
-    </dgm:fillClrLst>
-    <dgm:linClrLst meth="repeat">
-      <a:schemeClr val="dk1">
-        <a:alpha val="0"/>
-      </a:schemeClr>
-    </dgm:linClrLst>
-    <dgm:effectClrLst/>
-    <dgm:txLinClrLst/>
-    <dgm:txFillClrLst meth="repeat">
-      <a:schemeClr val="tx1"/>
-    </dgm:txFillClrLst>
-    <dgm:txEffectClrLst/>
-  </dgm:styleLbl>
-</dgm:colorsDef>
-</file>
-
-<file path=ppt/diagrams/data1.xml><?xml version="1.0" encoding="utf-8"?>
-<dgm:dataModel xmlns:dgm="http://schemas.openxmlformats.org/drawingml/2006/diagram" xmlns:a="http://schemas.openxmlformats.org/drawingml/2006/main">
-  <dgm:ptLst>
-    <dgm:pt modelId="{EE7F4959-AF81-40A4-B035-D23A6CA191CE}" type="doc">
-      <dgm:prSet loTypeId="urn:microsoft.com/office/officeart/2005/8/layout/hProcess9" loCatId="process" qsTypeId="urn:microsoft.com/office/officeart/2005/8/quickstyle/simple1" qsCatId="simple" csTypeId="urn:microsoft.com/office/officeart/2005/8/colors/accent1_2" csCatId="accent1" phldr="1"/>
-      <dgm:spPr/>
-      <dgm:t>
-        <a:bodyPr/>
-        <a:lstStyle/>
-        <a:p>
-          <a:endParaRPr lang="es-ES"/>
-        </a:p>
-      </dgm:t>
-    </dgm:pt>
-    <dgm:pt modelId="{6169771A-B762-40D1-9B39-56B4DD27D746}">
-      <dgm:prSet phldrT="[Texto]" custT="1"/>
-      <dgm:spPr>
-        <a:solidFill>
-          <a:srgbClr val="FFC000"/>
-        </a:solidFill>
-      </dgm:spPr>
-      <dgm:t>
-        <a:bodyPr/>
-        <a:lstStyle/>
-        <a:p>
-          <a:r>
-            <a:rPr lang="es-ES" sz="3200" dirty="0">
-              <a:solidFill>
-                <a:srgbClr val="002060"/>
-              </a:solidFill>
-            </a:rPr>
-            <a:t>(i) </a:t>
-          </a:r>
-          <a:r>
-            <a:rPr lang="es-ES" sz="3200" dirty="0" err="1">
-              <a:solidFill>
-                <a:srgbClr val="002060"/>
-              </a:solidFill>
-            </a:rPr>
-            <a:t>Semivariogram</a:t>
-          </a:r>
-          <a:endParaRPr lang="es-ES" sz="3200" dirty="0">
-            <a:solidFill>
-              <a:srgbClr val="002060"/>
-            </a:solidFill>
-          </a:endParaRPr>
-        </a:p>
-      </dgm:t>
-    </dgm:pt>
-    <dgm:pt modelId="{7353E509-428E-49D1-88DB-51C2D08B53C4}" type="parTrans" cxnId="{CA861098-88D5-42F0-9B4B-A453C070E04F}">
-      <dgm:prSet/>
-      <dgm:spPr/>
-      <dgm:t>
-        <a:bodyPr/>
-        <a:lstStyle/>
-        <a:p>
-          <a:endParaRPr lang="es-ES"/>
-        </a:p>
-      </dgm:t>
-    </dgm:pt>
-    <dgm:pt modelId="{CB3EC1DE-B94F-44B7-892E-EFDA0F4557E0}" type="sibTrans" cxnId="{CA861098-88D5-42F0-9B4B-A453C070E04F}">
-      <dgm:prSet/>
-      <dgm:spPr/>
-      <dgm:t>
-        <a:bodyPr/>
-        <a:lstStyle/>
-        <a:p>
-          <a:endParaRPr lang="es-ES"/>
-        </a:p>
-      </dgm:t>
-    </dgm:pt>
-    <dgm:pt modelId="{639E45BA-22DF-41EC-8A76-3CA0A4FF2C3D}">
-      <dgm:prSet phldrT="[Texto]" custT="1"/>
-      <dgm:spPr>
-        <a:solidFill>
-          <a:srgbClr val="FFC000"/>
-        </a:solidFill>
-      </dgm:spPr>
-      <dgm:t>
-        <a:bodyPr/>
-        <a:lstStyle/>
-        <a:p>
-          <a:pPr>
-            <a:buNone/>
-          </a:pPr>
-          <a:r>
-            <a:rPr lang="es-ES" sz="3200" dirty="0">
-              <a:solidFill>
-                <a:srgbClr val="002060"/>
-              </a:solidFill>
-            </a:rPr>
-            <a:t>(</a:t>
-          </a:r>
-          <a:r>
-            <a:rPr lang="es-ES" sz="3200" dirty="0" err="1">
-              <a:solidFill>
-                <a:srgbClr val="002060"/>
-              </a:solidFill>
-            </a:rPr>
-            <a:t>ii</a:t>
-          </a:r>
-          <a:r>
-            <a:rPr lang="es-ES" sz="3200" dirty="0">
-              <a:solidFill>
-                <a:srgbClr val="002060"/>
-              </a:solidFill>
-            </a:rPr>
-            <a:t>) </a:t>
-          </a:r>
-          <a:r>
-            <a:rPr lang="es-ES" sz="3200" dirty="0" err="1">
-              <a:solidFill>
-                <a:srgbClr val="002060"/>
-              </a:solidFill>
-            </a:rPr>
-            <a:t>sPCA</a:t>
-          </a:r>
-          <a:endParaRPr lang="es-ES" sz="3200" dirty="0">
-            <a:solidFill>
-              <a:srgbClr val="002060"/>
-            </a:solidFill>
-          </a:endParaRPr>
-        </a:p>
-      </dgm:t>
-    </dgm:pt>
-    <dgm:pt modelId="{0D1BCC02-12BD-4982-9063-211C4BD40F4F}" type="parTrans" cxnId="{FF0CB84D-634B-457F-853E-3D58C6BE4EC8}">
-      <dgm:prSet/>
-      <dgm:spPr/>
-      <dgm:t>
-        <a:bodyPr/>
-        <a:lstStyle/>
-        <a:p>
-          <a:endParaRPr lang="es-ES"/>
-        </a:p>
-      </dgm:t>
-    </dgm:pt>
-    <dgm:pt modelId="{C60501DA-7C28-45B2-8615-B6EB22F6E7C1}" type="sibTrans" cxnId="{FF0CB84D-634B-457F-853E-3D58C6BE4EC8}">
-      <dgm:prSet/>
-      <dgm:spPr/>
-      <dgm:t>
-        <a:bodyPr/>
-        <a:lstStyle/>
-        <a:p>
-          <a:endParaRPr lang="es-ES"/>
-        </a:p>
-      </dgm:t>
-    </dgm:pt>
-    <dgm:pt modelId="{0048491C-1613-4577-9E14-E12F5FE38416}">
-      <dgm:prSet phldrT="[Texto]" custT="1"/>
-      <dgm:spPr/>
-      <dgm:t>
-        <a:bodyPr/>
-        <a:lstStyle/>
-        <a:p>
-          <a:r>
-            <a:rPr lang="es-ES" sz="2400" dirty="0" err="1">
-              <a:solidFill>
-                <a:srgbClr val="002060"/>
-              </a:solidFill>
-            </a:rPr>
-            <a:t>Optimization</a:t>
-          </a:r>
-          <a:r>
-            <a:rPr lang="es-ES" sz="2400" dirty="0">
-              <a:solidFill>
-                <a:srgbClr val="002060"/>
-              </a:solidFill>
-            </a:rPr>
-            <a:t> in</a:t>
-          </a:r>
-        </a:p>
-      </dgm:t>
-    </dgm:pt>
-    <dgm:pt modelId="{3D5F2557-A7EA-4B1E-B56B-2D51705BC7BD}" type="parTrans" cxnId="{4AC60D86-6B80-4229-8919-84DCF7B84A0C}">
-      <dgm:prSet/>
-      <dgm:spPr/>
-      <dgm:t>
-        <a:bodyPr/>
-        <a:lstStyle/>
-        <a:p>
-          <a:endParaRPr lang="es-ES"/>
-        </a:p>
-      </dgm:t>
-    </dgm:pt>
-    <dgm:pt modelId="{E42D2711-FC72-4167-A92C-342B2946D168}" type="sibTrans" cxnId="{4AC60D86-6B80-4229-8919-84DCF7B84A0C}">
-      <dgm:prSet/>
-      <dgm:spPr/>
-      <dgm:t>
-        <a:bodyPr/>
-        <a:lstStyle/>
-        <a:p>
-          <a:endParaRPr lang="es-ES"/>
-        </a:p>
-      </dgm:t>
-    </dgm:pt>
-    <dgm:pt modelId="{DAB0CDBD-1600-427E-A448-8D50395F37A6}">
-      <dgm:prSet phldrT="[Texto]" custT="1"/>
-      <dgm:spPr>
-        <a:solidFill>
-          <a:srgbClr val="FFC000"/>
-        </a:solidFill>
-      </dgm:spPr>
-      <dgm:t>
-        <a:bodyPr/>
-        <a:lstStyle/>
-        <a:p>
-          <a:r>
-            <a:rPr lang="es-ES" sz="3200" dirty="0">
-              <a:solidFill>
-                <a:srgbClr val="002060"/>
-              </a:solidFill>
-            </a:rPr>
-            <a:t>(</a:t>
-          </a:r>
-          <a:r>
-            <a:rPr lang="es-ES" sz="3200" dirty="0" err="1">
-              <a:solidFill>
-                <a:srgbClr val="002060"/>
-              </a:solidFill>
-            </a:rPr>
-            <a:t>iii</a:t>
-          </a:r>
-          <a:r>
-            <a:rPr lang="es-ES" sz="3200" dirty="0">
-              <a:solidFill>
-                <a:srgbClr val="002060"/>
-              </a:solidFill>
-            </a:rPr>
-            <a:t>) </a:t>
-          </a:r>
-          <a:r>
-            <a:rPr lang="es-ES" sz="3200" dirty="0" err="1">
-              <a:solidFill>
-                <a:srgbClr val="002060"/>
-              </a:solidFill>
-            </a:rPr>
-            <a:t>sDRI</a:t>
-          </a:r>
-          <a:endParaRPr lang="es-ES" sz="3200" dirty="0">
-            <a:solidFill>
-              <a:srgbClr val="002060"/>
-            </a:solidFill>
-          </a:endParaRPr>
-        </a:p>
-      </dgm:t>
-    </dgm:pt>
-    <dgm:pt modelId="{DA1560D6-20CC-4E8B-8549-3FE6773BF4ED}" type="parTrans" cxnId="{0AECA000-1D66-4F7C-B1E1-DE2DEB6B6013}">
-      <dgm:prSet/>
-      <dgm:spPr/>
-      <dgm:t>
-        <a:bodyPr/>
-        <a:lstStyle/>
-        <a:p>
-          <a:endParaRPr lang="es-ES"/>
-        </a:p>
-      </dgm:t>
-    </dgm:pt>
-    <dgm:pt modelId="{691E4D9D-83D4-446D-94D6-B28B4B938AF6}" type="sibTrans" cxnId="{0AECA000-1D66-4F7C-B1E1-DE2DEB6B6013}">
-      <dgm:prSet/>
-      <dgm:spPr/>
-      <dgm:t>
-        <a:bodyPr/>
-        <a:lstStyle/>
-        <a:p>
-          <a:endParaRPr lang="es-ES"/>
-        </a:p>
-      </dgm:t>
-    </dgm:pt>
-    <dgm:pt modelId="{03D60359-FED6-48FA-8720-086B7CD5C4B9}">
-      <dgm:prSet phldrT="[Texto]" custT="1"/>
-      <dgm:spPr/>
-      <dgm:t>
-        <a:bodyPr/>
-        <a:lstStyle/>
-        <a:p>
-          <a:r>
-            <a:rPr lang="en-US" sz="2400" dirty="0">
-              <a:solidFill>
-                <a:srgbClr val="002060"/>
-              </a:solidFill>
-            </a:rPr>
-            <a:t>Extraction of first principal component</a:t>
-          </a:r>
-          <a:endParaRPr lang="es-ES" sz="2400" dirty="0">
-            <a:solidFill>
-              <a:srgbClr val="002060"/>
-            </a:solidFill>
-          </a:endParaRPr>
-        </a:p>
-      </dgm:t>
-    </dgm:pt>
-    <dgm:pt modelId="{52E08C53-D959-42DC-B56C-12F38D1133D4}" type="parTrans" cxnId="{7D47525F-7607-4EF0-A0AD-1292549704E0}">
-      <dgm:prSet/>
-      <dgm:spPr/>
-      <dgm:t>
-        <a:bodyPr/>
-        <a:lstStyle/>
-        <a:p>
-          <a:endParaRPr lang="es-ES"/>
-        </a:p>
-      </dgm:t>
-    </dgm:pt>
-    <dgm:pt modelId="{83CD65E9-7E09-46B2-BF43-3F5E4B16E415}" type="sibTrans" cxnId="{7D47525F-7607-4EF0-A0AD-1292549704E0}">
-      <dgm:prSet/>
-      <dgm:spPr/>
-      <dgm:t>
-        <a:bodyPr/>
-        <a:lstStyle/>
-        <a:p>
-          <a:endParaRPr lang="es-ES"/>
-        </a:p>
-      </dgm:t>
-    </dgm:pt>
-    <dgm:pt modelId="{4235533D-A9F2-42A5-86AD-DF4FEEF7A8A3}">
-      <dgm:prSet/>
-      <dgm:spPr/>
-      <dgm:t>
-        <a:bodyPr/>
-        <a:lstStyle/>
-        <a:p>
-          <a:endParaRPr lang="es-ES" sz="2400" dirty="0">
-            <a:solidFill>
-              <a:srgbClr val="002060"/>
-            </a:solidFill>
-          </a:endParaRPr>
-        </a:p>
-      </dgm:t>
-    </dgm:pt>
-    <dgm:pt modelId="{6E90250A-FE4B-45CF-A1C7-F64313AC31EE}" type="parTrans" cxnId="{0868B720-D4A5-4A33-A507-8F0DD7BDB9D1}">
-      <dgm:prSet/>
-      <dgm:spPr/>
-      <dgm:t>
-        <a:bodyPr/>
-        <a:lstStyle/>
-        <a:p>
-          <a:endParaRPr lang="es-ES"/>
-        </a:p>
-      </dgm:t>
-    </dgm:pt>
-    <dgm:pt modelId="{72E262AC-1EB5-44FC-BD88-563F36ABFE49}" type="sibTrans" cxnId="{0868B720-D4A5-4A33-A507-8F0DD7BDB9D1}">
-      <dgm:prSet/>
-      <dgm:spPr/>
-      <dgm:t>
-        <a:bodyPr/>
-        <a:lstStyle/>
-        <a:p>
-          <a:endParaRPr lang="es-ES"/>
-        </a:p>
-      </dgm:t>
-    </dgm:pt>
-    <dgm:pt modelId="{08329EC9-D82A-4B44-8EF8-FBE47D1438E4}">
-      <dgm:prSet/>
-      <dgm:spPr/>
-      <dgm:t>
-        <a:bodyPr/>
-        <a:lstStyle/>
-        <a:p>
-          <a:endParaRPr lang="es-ES" sz="3600" dirty="0">
-            <a:solidFill>
-              <a:srgbClr val="002060"/>
-            </a:solidFill>
-          </a:endParaRPr>
-        </a:p>
-      </dgm:t>
-    </dgm:pt>
-    <dgm:pt modelId="{A08B2752-93D0-4C15-B8B8-4CD6B90C9C4C}" type="parTrans" cxnId="{50541BD7-132A-4344-96E1-A3B1A1E5FEB2}">
-      <dgm:prSet/>
-      <dgm:spPr/>
-      <dgm:t>
-        <a:bodyPr/>
-        <a:lstStyle/>
-        <a:p>
-          <a:endParaRPr lang="es-ES"/>
-        </a:p>
-      </dgm:t>
-    </dgm:pt>
-    <dgm:pt modelId="{A65B454F-7082-441F-957D-C7FB662F5ACB}" type="sibTrans" cxnId="{50541BD7-132A-4344-96E1-A3B1A1E5FEB2}">
-      <dgm:prSet/>
-      <dgm:spPr/>
-      <dgm:t>
-        <a:bodyPr/>
-        <a:lstStyle/>
-        <a:p>
-          <a:endParaRPr lang="es-ES"/>
-        </a:p>
-      </dgm:t>
-    </dgm:pt>
-    <dgm:pt modelId="{0D5A3E99-91D6-446B-9A7F-EFE017E59D81}">
-      <dgm:prSet phldrT="[Texto]" custT="1"/>
-      <dgm:spPr/>
-      <dgm:t>
-        <a:bodyPr/>
-        <a:lstStyle/>
-        <a:p>
-          <a:pPr>
-            <a:buNone/>
-          </a:pPr>
-          <a:r>
-            <a:rPr lang="es-ES" sz="2400" dirty="0">
-              <a:solidFill>
-                <a:srgbClr val="002060"/>
-              </a:solidFill>
-            </a:rPr>
-            <a:t>   10-multidimensional </a:t>
-          </a:r>
-          <a:r>
-            <a:rPr lang="es-ES" sz="2400" dirty="0" err="1">
-              <a:solidFill>
-                <a:srgbClr val="002060"/>
-              </a:solidFill>
-            </a:rPr>
-            <a:t>space</a:t>
-          </a:r>
-          <a:endParaRPr lang="es-ES" sz="2400" dirty="0">
-            <a:solidFill>
-              <a:srgbClr val="002060"/>
-            </a:solidFill>
-          </a:endParaRPr>
-        </a:p>
-      </dgm:t>
-    </dgm:pt>
-    <dgm:pt modelId="{729D6EFF-5DDD-4E6A-AA3C-376FB9027954}" type="parTrans" cxnId="{C5290487-0E74-453E-ACB9-E96A28414A08}">
-      <dgm:prSet/>
-      <dgm:spPr/>
-      <dgm:t>
-        <a:bodyPr/>
-        <a:lstStyle/>
-        <a:p>
-          <a:endParaRPr lang="es-ES"/>
-        </a:p>
-      </dgm:t>
-    </dgm:pt>
-    <dgm:pt modelId="{F3F0B4EF-1358-456B-B894-FC109E9AFF55}" type="sibTrans" cxnId="{C5290487-0E74-453E-ACB9-E96A28414A08}">
-      <dgm:prSet/>
-      <dgm:spPr/>
-      <dgm:t>
-        <a:bodyPr/>
-        <a:lstStyle/>
-        <a:p>
-          <a:endParaRPr lang="es-ES"/>
-        </a:p>
-      </dgm:t>
-    </dgm:pt>
-    <dgm:pt modelId="{38BF8FC2-A81B-4F7B-91EE-4C3D56908B9C}">
-      <dgm:prSet phldrT="[Texto]" custT="1"/>
-      <dgm:spPr/>
-      <dgm:t>
-        <a:bodyPr/>
-        <a:lstStyle/>
-        <a:p>
-          <a:r>
-            <a:rPr lang="es-ES" sz="2400" dirty="0" err="1">
-              <a:solidFill>
-                <a:srgbClr val="002060"/>
-              </a:solidFill>
-            </a:rPr>
-            <a:t>Moran’s</a:t>
-          </a:r>
-          <a:r>
-            <a:rPr lang="es-ES" sz="2400" dirty="0">
-              <a:solidFill>
-                <a:srgbClr val="002060"/>
-              </a:solidFill>
-            </a:rPr>
-            <a:t> I</a:t>
-          </a:r>
-        </a:p>
-      </dgm:t>
-    </dgm:pt>
-    <dgm:pt modelId="{68722660-63C2-4F57-B8B0-057EA6DF2BAF}" type="parTrans" cxnId="{5D1C4712-12C0-456D-A028-F8FD27754F2A}">
-      <dgm:prSet/>
-      <dgm:spPr/>
-      <dgm:t>
-        <a:bodyPr/>
-        <a:lstStyle/>
-        <a:p>
-          <a:endParaRPr lang="es-ES"/>
-        </a:p>
-      </dgm:t>
-    </dgm:pt>
-    <dgm:pt modelId="{C134A88D-7B52-414E-B503-08BB1FE6BFD0}" type="sibTrans" cxnId="{5D1C4712-12C0-456D-A028-F8FD27754F2A}">
-      <dgm:prSet/>
-      <dgm:spPr/>
-      <dgm:t>
-        <a:bodyPr/>
-        <a:lstStyle/>
-        <a:p>
-          <a:endParaRPr lang="es-ES"/>
-        </a:p>
-      </dgm:t>
-    </dgm:pt>
-    <dgm:pt modelId="{F76A1EBF-FD1F-49FE-848D-690DCC14F4A0}">
-      <dgm:prSet phldrT="[Texto]" custT="1"/>
-      <dgm:spPr/>
-      <dgm:t>
-        <a:bodyPr/>
-        <a:lstStyle/>
-        <a:p>
-          <a:r>
-            <a:rPr lang="en-US" sz="2400" dirty="0">
-              <a:solidFill>
-                <a:srgbClr val="002060"/>
-              </a:solidFill>
-            </a:rPr>
-            <a:t>Scaling from 0 to 100</a:t>
-          </a:r>
-          <a:endParaRPr lang="es-ES" sz="2400" dirty="0">
-            <a:solidFill>
-              <a:srgbClr val="002060"/>
-            </a:solidFill>
-          </a:endParaRPr>
-        </a:p>
-      </dgm:t>
-    </dgm:pt>
-    <dgm:pt modelId="{E9BC3417-AC5B-4651-90CF-77A8E8705F69}" type="parTrans" cxnId="{866E66B4-F788-4D7A-A0B9-B8BAB287E490}">
-      <dgm:prSet/>
-      <dgm:spPr/>
-      <dgm:t>
-        <a:bodyPr/>
-        <a:lstStyle/>
-        <a:p>
-          <a:endParaRPr lang="es-ES"/>
-        </a:p>
-      </dgm:t>
-    </dgm:pt>
-    <dgm:pt modelId="{4A3E568C-4DD3-43CB-B6C9-251B23B0D395}" type="sibTrans" cxnId="{866E66B4-F788-4D7A-A0B9-B8BAB287E490}">
-      <dgm:prSet/>
-      <dgm:spPr/>
-      <dgm:t>
-        <a:bodyPr/>
-        <a:lstStyle/>
-        <a:p>
-          <a:endParaRPr lang="es-ES"/>
-        </a:p>
-      </dgm:t>
-    </dgm:pt>
-    <dgm:pt modelId="{706D4A31-AC7A-438C-8E27-F55AEDCBE3DE}">
-      <dgm:prSet phldrT="[Texto]" custT="1"/>
-      <dgm:spPr/>
-      <dgm:t>
-        <a:bodyPr/>
-        <a:lstStyle/>
-        <a:p>
-          <a:r>
-            <a:rPr lang="es-ES" sz="2400" dirty="0" err="1">
-              <a:solidFill>
-                <a:srgbClr val="002060"/>
-              </a:solidFill>
-            </a:rPr>
-            <a:t>Mapping</a:t>
-          </a:r>
-          <a:endParaRPr lang="es-ES" sz="2400" dirty="0">
-            <a:solidFill>
-              <a:srgbClr val="002060"/>
-            </a:solidFill>
-          </a:endParaRPr>
-        </a:p>
-      </dgm:t>
-    </dgm:pt>
-    <dgm:pt modelId="{C6D889ED-8672-469D-AC46-9A944BD85D01}" type="parTrans" cxnId="{BA4788CB-A36C-41F1-A6AB-371809C8FA7A}">
-      <dgm:prSet/>
-      <dgm:spPr/>
-      <dgm:t>
-        <a:bodyPr/>
-        <a:lstStyle/>
-        <a:p>
-          <a:endParaRPr lang="es-ES"/>
-        </a:p>
-      </dgm:t>
-    </dgm:pt>
-    <dgm:pt modelId="{6E64BF20-A3E6-4B30-A297-70E136D4FC4C}" type="sibTrans" cxnId="{BA4788CB-A36C-41F1-A6AB-371809C8FA7A}">
-      <dgm:prSet/>
-      <dgm:spPr/>
-      <dgm:t>
-        <a:bodyPr/>
-        <a:lstStyle/>
-        <a:p>
-          <a:endParaRPr lang="es-ES"/>
-        </a:p>
-      </dgm:t>
-    </dgm:pt>
-    <dgm:pt modelId="{54F20BBB-0F91-4F32-B6C4-B89CAD60F9CA}">
-      <dgm:prSet phldrT="[Texto]" custT="1"/>
-      <dgm:spPr/>
-      <dgm:t>
-        <a:bodyPr/>
-        <a:lstStyle/>
-        <a:p>
-          <a:r>
-            <a:rPr lang="es-ES" sz="2400" dirty="0" err="1">
-              <a:solidFill>
-                <a:srgbClr val="002060"/>
-              </a:solidFill>
-            </a:rPr>
-            <a:t>Detection</a:t>
-          </a:r>
-          <a:r>
-            <a:rPr lang="es-ES" sz="2400" dirty="0">
-              <a:solidFill>
-                <a:srgbClr val="002060"/>
-              </a:solidFill>
-            </a:rPr>
-            <a:t> </a:t>
-          </a:r>
-          <a:r>
-            <a:rPr lang="es-ES" sz="2400" dirty="0" err="1">
-              <a:solidFill>
-                <a:srgbClr val="002060"/>
-              </a:solidFill>
-            </a:rPr>
-            <a:t>of</a:t>
-          </a:r>
-          <a:r>
-            <a:rPr lang="es-ES" sz="2400" dirty="0">
-              <a:solidFill>
-                <a:srgbClr val="002060"/>
-              </a:solidFill>
-            </a:rPr>
-            <a:t> </a:t>
-          </a:r>
-          <a:r>
-            <a:rPr lang="es-ES" sz="2400" dirty="0" err="1">
-              <a:solidFill>
-                <a:srgbClr val="002060"/>
-              </a:solidFill>
-            </a:rPr>
-            <a:t>spatial</a:t>
-          </a:r>
-          <a:r>
-            <a:rPr lang="es-ES" sz="2400" dirty="0">
-              <a:solidFill>
-                <a:srgbClr val="002060"/>
-              </a:solidFill>
-            </a:rPr>
-            <a:t> </a:t>
-          </a:r>
-          <a:r>
-            <a:rPr lang="es-ES" sz="2400" dirty="0" err="1">
-              <a:solidFill>
-                <a:srgbClr val="002060"/>
-              </a:solidFill>
-            </a:rPr>
-            <a:t>dependence</a:t>
-          </a:r>
-          <a:endParaRPr lang="es-ES" sz="2400" dirty="0">
-            <a:solidFill>
-              <a:srgbClr val="002060"/>
-            </a:solidFill>
-          </a:endParaRPr>
-        </a:p>
-      </dgm:t>
-    </dgm:pt>
-    <dgm:pt modelId="{94CB1099-E61B-4D2D-AA7F-CAE0ED6D2BA3}" type="sibTrans" cxnId="{3EF3F57E-05FE-42A1-A072-CC56CF7910F7}">
-      <dgm:prSet/>
-      <dgm:spPr/>
-      <dgm:t>
-        <a:bodyPr/>
-        <a:lstStyle/>
-        <a:p>
-          <a:endParaRPr lang="es-ES"/>
-        </a:p>
-      </dgm:t>
-    </dgm:pt>
-    <dgm:pt modelId="{9F8AF3BF-1B0D-4CD9-8AF0-8FA785B4739E}" type="parTrans" cxnId="{3EF3F57E-05FE-42A1-A072-CC56CF7910F7}">
-      <dgm:prSet/>
-      <dgm:spPr/>
-      <dgm:t>
-        <a:bodyPr/>
-        <a:lstStyle/>
-        <a:p>
-          <a:endParaRPr lang="es-ES"/>
-        </a:p>
-      </dgm:t>
-    </dgm:pt>
-    <dgm:pt modelId="{420A89A3-1AC7-4753-B957-3B53C82DAA8E}">
-      <dgm:prSet phldrT="[Texto]" custT="1"/>
-      <dgm:spPr/>
-      <dgm:t>
-        <a:bodyPr/>
-        <a:lstStyle/>
-        <a:p>
-          <a:r>
-            <a:rPr lang="es-ES" sz="2400" dirty="0" err="1">
-              <a:solidFill>
-                <a:srgbClr val="002060"/>
-              </a:solidFill>
-            </a:rPr>
-            <a:t>Range</a:t>
-          </a:r>
-          <a:endParaRPr lang="es-ES" sz="2400" dirty="0">
-            <a:solidFill>
-              <a:srgbClr val="002060"/>
-            </a:solidFill>
-          </a:endParaRPr>
-        </a:p>
-      </dgm:t>
-    </dgm:pt>
-    <dgm:pt modelId="{E1465F48-E251-4335-A54D-1C6943BA9561}" type="parTrans" cxnId="{F2FC3F9E-65C5-46F4-AA24-909D3249F81A}">
-      <dgm:prSet/>
-      <dgm:spPr/>
-      <dgm:t>
-        <a:bodyPr/>
-        <a:lstStyle/>
-        <a:p>
-          <a:endParaRPr lang="es-ES"/>
-        </a:p>
-      </dgm:t>
-    </dgm:pt>
-    <dgm:pt modelId="{BFDDE833-FE6A-4B6B-8A54-1DAAE61527F5}" type="sibTrans" cxnId="{F2FC3F9E-65C5-46F4-AA24-909D3249F81A}">
-      <dgm:prSet/>
-      <dgm:spPr/>
-      <dgm:t>
-        <a:bodyPr/>
-        <a:lstStyle/>
-        <a:p>
-          <a:endParaRPr lang="es-ES"/>
-        </a:p>
-      </dgm:t>
-    </dgm:pt>
-    <dgm:pt modelId="{226DD8DF-ADDF-43E2-8326-59F8CE4F1D2B}" type="pres">
-      <dgm:prSet presAssocID="{EE7F4959-AF81-40A4-B035-D23A6CA191CE}" presName="CompostProcess" presStyleCnt="0">
-        <dgm:presLayoutVars>
-          <dgm:dir/>
-          <dgm:resizeHandles val="exact"/>
-        </dgm:presLayoutVars>
-      </dgm:prSet>
-      <dgm:spPr/>
-    </dgm:pt>
-    <dgm:pt modelId="{67356863-DDC2-478E-B3F0-64EF76622992}" type="pres">
-      <dgm:prSet presAssocID="{EE7F4959-AF81-40A4-B035-D23A6CA191CE}" presName="arrow" presStyleLbl="bgShp" presStyleIdx="0" presStyleCnt="1" custScaleX="117647" custScaleY="89239"/>
-      <dgm:spPr>
-        <a:solidFill>
-          <a:srgbClr val="288A8C"/>
-        </a:solidFill>
-        <a:ln>
-          <a:solidFill>
-            <a:schemeClr val="accent6">
-              <a:lumMod val="50000"/>
-            </a:schemeClr>
-          </a:solidFill>
-        </a:ln>
-      </dgm:spPr>
-    </dgm:pt>
-    <dgm:pt modelId="{E1ED0CCE-6577-4B30-8B1F-D1C85516E5D1}" type="pres">
-      <dgm:prSet presAssocID="{EE7F4959-AF81-40A4-B035-D23A6CA191CE}" presName="linearProcess" presStyleCnt="0"/>
-      <dgm:spPr/>
-    </dgm:pt>
-    <dgm:pt modelId="{CF826550-DECD-43A9-BBC5-27C5DA3681FD}" type="pres">
-      <dgm:prSet presAssocID="{6169771A-B762-40D1-9B39-56B4DD27D746}" presName="textNode" presStyleLbl="node1" presStyleIdx="0" presStyleCnt="3" custScaleX="101371" custScaleY="87927" custLinFactNeighborY="-13451">
-        <dgm:presLayoutVars>
-          <dgm:bulletEnabled val="1"/>
-        </dgm:presLayoutVars>
-      </dgm:prSet>
-      <dgm:spPr/>
-    </dgm:pt>
-    <dgm:pt modelId="{522D0509-E2FE-497D-91A7-3E29CDC33A46}" type="pres">
-      <dgm:prSet presAssocID="{CB3EC1DE-B94F-44B7-892E-EFDA0F4557E0}" presName="sibTrans" presStyleCnt="0"/>
-      <dgm:spPr/>
-    </dgm:pt>
-    <dgm:pt modelId="{71F43AB1-FD89-4BC9-BF4C-8C51E62B2039}" type="pres">
-      <dgm:prSet presAssocID="{639E45BA-22DF-41EC-8A76-3CA0A4FF2C3D}" presName="textNode" presStyleLbl="node1" presStyleIdx="1" presStyleCnt="3" custScaleX="119808" custScaleY="87927" custLinFactNeighborX="-79333" custLinFactNeighborY="-13451">
-        <dgm:presLayoutVars>
-          <dgm:bulletEnabled val="1"/>
-        </dgm:presLayoutVars>
-      </dgm:prSet>
-      <dgm:spPr/>
-    </dgm:pt>
-    <dgm:pt modelId="{4FCB3396-0149-415A-93C2-BFB5B9397104}" type="pres">
-      <dgm:prSet presAssocID="{C60501DA-7C28-45B2-8615-B6EB22F6E7C1}" presName="sibTrans" presStyleCnt="0"/>
-      <dgm:spPr/>
-    </dgm:pt>
-    <dgm:pt modelId="{0535B7B9-03F3-4B8C-A3A2-F7664E6F080F}" type="pres">
-      <dgm:prSet presAssocID="{DAB0CDBD-1600-427E-A448-8D50395F37A6}" presName="textNode" presStyleLbl="node1" presStyleIdx="2" presStyleCnt="3" custScaleX="103202" custScaleY="87927" custLinFactX="-7824" custLinFactNeighborX="-100000" custLinFactNeighborY="-13451">
-        <dgm:presLayoutVars>
-          <dgm:bulletEnabled val="1"/>
-        </dgm:presLayoutVars>
-      </dgm:prSet>
-      <dgm:spPr/>
-    </dgm:pt>
-  </dgm:ptLst>
-  <dgm:cxnLst>
-    <dgm:cxn modelId="{0AECA000-1D66-4F7C-B1E1-DE2DEB6B6013}" srcId="{EE7F4959-AF81-40A4-B035-D23A6CA191CE}" destId="{DAB0CDBD-1600-427E-A448-8D50395F37A6}" srcOrd="2" destOrd="0" parTransId="{DA1560D6-20CC-4E8B-8549-3FE6773BF4ED}" sibTransId="{691E4D9D-83D4-446D-94D6-B28B4B938AF6}"/>
-    <dgm:cxn modelId="{73F5BD0E-E7AB-4A42-BBED-4B8701AE881F}" type="presOf" srcId="{F76A1EBF-FD1F-49FE-848D-690DCC14F4A0}" destId="{0535B7B9-03F3-4B8C-A3A2-F7664E6F080F}" srcOrd="0" destOrd="2" presId="urn:microsoft.com/office/officeart/2005/8/layout/hProcess9"/>
-    <dgm:cxn modelId="{5D1C4712-12C0-456D-A028-F8FD27754F2A}" srcId="{639E45BA-22DF-41EC-8A76-3CA0A4FF2C3D}" destId="{38BF8FC2-A81B-4F7B-91EE-4C3D56908B9C}" srcOrd="0" destOrd="0" parTransId="{68722660-63C2-4F57-B8B0-057EA6DF2BAF}" sibTransId="{C134A88D-7B52-414E-B503-08BB1FE6BFD0}"/>
-    <dgm:cxn modelId="{0868B720-D4A5-4A33-A507-8F0DD7BDB9D1}" srcId="{6169771A-B762-40D1-9B39-56B4DD27D746}" destId="{4235533D-A9F2-42A5-86AD-DF4FEEF7A8A3}" srcOrd="2" destOrd="0" parTransId="{6E90250A-FE4B-45CF-A1C7-F64313AC31EE}" sibTransId="{72E262AC-1EB5-44FC-BD88-563F36ABFE49}"/>
-    <dgm:cxn modelId="{8E143225-8E64-420C-9A3A-33CE9D818F3D}" type="presOf" srcId="{420A89A3-1AC7-4753-B957-3B53C82DAA8E}" destId="{CF826550-DECD-43A9-BBC5-27C5DA3681FD}" srcOrd="0" destOrd="2" presId="urn:microsoft.com/office/officeart/2005/8/layout/hProcess9"/>
-    <dgm:cxn modelId="{E1778325-B919-480D-AB37-5FEB9D5A819C}" type="presOf" srcId="{DAB0CDBD-1600-427E-A448-8D50395F37A6}" destId="{0535B7B9-03F3-4B8C-A3A2-F7664E6F080F}" srcOrd="0" destOrd="0" presId="urn:microsoft.com/office/officeart/2005/8/layout/hProcess9"/>
-    <dgm:cxn modelId="{9D8A725E-4955-4DB8-82B1-8C738CE31207}" type="presOf" srcId="{03D60359-FED6-48FA-8720-086B7CD5C4B9}" destId="{0535B7B9-03F3-4B8C-A3A2-F7664E6F080F}" srcOrd="0" destOrd="1" presId="urn:microsoft.com/office/officeart/2005/8/layout/hProcess9"/>
-    <dgm:cxn modelId="{7D47525F-7607-4EF0-A0AD-1292549704E0}" srcId="{DAB0CDBD-1600-427E-A448-8D50395F37A6}" destId="{03D60359-FED6-48FA-8720-086B7CD5C4B9}" srcOrd="0" destOrd="0" parTransId="{52E08C53-D959-42DC-B56C-12F38D1133D4}" sibTransId="{83CD65E9-7E09-46B2-BF43-3F5E4B16E415}"/>
-    <dgm:cxn modelId="{77A95B41-3515-45D7-8958-79DB1642206D}" type="presOf" srcId="{54F20BBB-0F91-4F32-B6C4-B89CAD60F9CA}" destId="{CF826550-DECD-43A9-BBC5-27C5DA3681FD}" srcOrd="0" destOrd="1" presId="urn:microsoft.com/office/officeart/2005/8/layout/hProcess9"/>
-    <dgm:cxn modelId="{B1509347-BB27-4F9A-87A6-1B2391637F6B}" type="presOf" srcId="{6169771A-B762-40D1-9B39-56B4DD27D746}" destId="{CF826550-DECD-43A9-BBC5-27C5DA3681FD}" srcOrd="0" destOrd="0" presId="urn:microsoft.com/office/officeart/2005/8/layout/hProcess9"/>
-    <dgm:cxn modelId="{C356306D-EF6D-43CD-ABBA-6437C2416E1B}" type="presOf" srcId="{0048491C-1613-4577-9E14-E12F5FE38416}" destId="{71F43AB1-FD89-4BC9-BF4C-8C51E62B2039}" srcOrd="0" destOrd="2" presId="urn:microsoft.com/office/officeart/2005/8/layout/hProcess9"/>
-    <dgm:cxn modelId="{66E0B04D-925B-4E4C-BAC2-8A86FBBEF44A}" type="presOf" srcId="{38BF8FC2-A81B-4F7B-91EE-4C3D56908B9C}" destId="{71F43AB1-FD89-4BC9-BF4C-8C51E62B2039}" srcOrd="0" destOrd="1" presId="urn:microsoft.com/office/officeart/2005/8/layout/hProcess9"/>
-    <dgm:cxn modelId="{FF0CB84D-634B-457F-853E-3D58C6BE4EC8}" srcId="{EE7F4959-AF81-40A4-B035-D23A6CA191CE}" destId="{639E45BA-22DF-41EC-8A76-3CA0A4FF2C3D}" srcOrd="1" destOrd="0" parTransId="{0D1BCC02-12BD-4982-9063-211C4BD40F4F}" sibTransId="{C60501DA-7C28-45B2-8615-B6EB22F6E7C1}"/>
-    <dgm:cxn modelId="{5EF1F97B-50E1-4DD0-82EC-707E1581A52A}" type="presOf" srcId="{4235533D-A9F2-42A5-86AD-DF4FEEF7A8A3}" destId="{CF826550-DECD-43A9-BBC5-27C5DA3681FD}" srcOrd="0" destOrd="3" presId="urn:microsoft.com/office/officeart/2005/8/layout/hProcess9"/>
-    <dgm:cxn modelId="{3EF3F57E-05FE-42A1-A072-CC56CF7910F7}" srcId="{6169771A-B762-40D1-9B39-56B4DD27D746}" destId="{54F20BBB-0F91-4F32-B6C4-B89CAD60F9CA}" srcOrd="0" destOrd="0" parTransId="{9F8AF3BF-1B0D-4CD9-8AF0-8FA785B4739E}" sibTransId="{94CB1099-E61B-4D2D-AA7F-CAE0ED6D2BA3}"/>
-    <dgm:cxn modelId="{4AC60D86-6B80-4229-8919-84DCF7B84A0C}" srcId="{639E45BA-22DF-41EC-8A76-3CA0A4FF2C3D}" destId="{0048491C-1613-4577-9E14-E12F5FE38416}" srcOrd="1" destOrd="0" parTransId="{3D5F2557-A7EA-4B1E-B56B-2D51705BC7BD}" sibTransId="{E42D2711-FC72-4167-A92C-342B2946D168}"/>
-    <dgm:cxn modelId="{C5290487-0E74-453E-ACB9-E96A28414A08}" srcId="{639E45BA-22DF-41EC-8A76-3CA0A4FF2C3D}" destId="{0D5A3E99-91D6-446B-9A7F-EFE017E59D81}" srcOrd="2" destOrd="0" parTransId="{729D6EFF-5DDD-4E6A-AA3C-376FB9027954}" sibTransId="{F3F0B4EF-1358-456B-B894-FC109E9AFF55}"/>
-    <dgm:cxn modelId="{CA861098-88D5-42F0-9B4B-A453C070E04F}" srcId="{EE7F4959-AF81-40A4-B035-D23A6CA191CE}" destId="{6169771A-B762-40D1-9B39-56B4DD27D746}" srcOrd="0" destOrd="0" parTransId="{7353E509-428E-49D1-88DB-51C2D08B53C4}" sibTransId="{CB3EC1DE-B94F-44B7-892E-EFDA0F4557E0}"/>
-    <dgm:cxn modelId="{F2FC3F9E-65C5-46F4-AA24-909D3249F81A}" srcId="{6169771A-B762-40D1-9B39-56B4DD27D746}" destId="{420A89A3-1AC7-4753-B957-3B53C82DAA8E}" srcOrd="1" destOrd="0" parTransId="{E1465F48-E251-4335-A54D-1C6943BA9561}" sibTransId="{BFDDE833-FE6A-4B6B-8A54-1DAAE61527F5}"/>
-    <dgm:cxn modelId="{866E66B4-F788-4D7A-A0B9-B8BAB287E490}" srcId="{DAB0CDBD-1600-427E-A448-8D50395F37A6}" destId="{F76A1EBF-FD1F-49FE-848D-690DCC14F4A0}" srcOrd="1" destOrd="0" parTransId="{E9BC3417-AC5B-4651-90CF-77A8E8705F69}" sibTransId="{4A3E568C-4DD3-43CB-B6C9-251B23B0D395}"/>
-    <dgm:cxn modelId="{B9FFC6BA-EC75-4C43-BFE1-54392076ACD3}" type="presOf" srcId="{639E45BA-22DF-41EC-8A76-3CA0A4FF2C3D}" destId="{71F43AB1-FD89-4BC9-BF4C-8C51E62B2039}" srcOrd="0" destOrd="0" presId="urn:microsoft.com/office/officeart/2005/8/layout/hProcess9"/>
-    <dgm:cxn modelId="{E71209C3-4729-4797-AED6-7B803EF63A03}" type="presOf" srcId="{08329EC9-D82A-4B44-8EF8-FBE47D1438E4}" destId="{0535B7B9-03F3-4B8C-A3A2-F7664E6F080F}" srcOrd="0" destOrd="4" presId="urn:microsoft.com/office/officeart/2005/8/layout/hProcess9"/>
-    <dgm:cxn modelId="{C3595FCA-284F-4417-82D1-FDE8BC7C9537}" type="presOf" srcId="{706D4A31-AC7A-438C-8E27-F55AEDCBE3DE}" destId="{0535B7B9-03F3-4B8C-A3A2-F7664E6F080F}" srcOrd="0" destOrd="3" presId="urn:microsoft.com/office/officeart/2005/8/layout/hProcess9"/>
-    <dgm:cxn modelId="{BA4788CB-A36C-41F1-A6AB-371809C8FA7A}" srcId="{DAB0CDBD-1600-427E-A448-8D50395F37A6}" destId="{706D4A31-AC7A-438C-8E27-F55AEDCBE3DE}" srcOrd="2" destOrd="0" parTransId="{C6D889ED-8672-469D-AC46-9A944BD85D01}" sibTransId="{6E64BF20-A3E6-4B30-A297-70E136D4FC4C}"/>
-    <dgm:cxn modelId="{BF3901D4-172F-4BD8-A0B4-53CE9FF01C1E}" type="presOf" srcId="{EE7F4959-AF81-40A4-B035-D23A6CA191CE}" destId="{226DD8DF-ADDF-43E2-8326-59F8CE4F1D2B}" srcOrd="0" destOrd="0" presId="urn:microsoft.com/office/officeart/2005/8/layout/hProcess9"/>
-    <dgm:cxn modelId="{50541BD7-132A-4344-96E1-A3B1A1E5FEB2}" srcId="{DAB0CDBD-1600-427E-A448-8D50395F37A6}" destId="{08329EC9-D82A-4B44-8EF8-FBE47D1438E4}" srcOrd="3" destOrd="0" parTransId="{A08B2752-93D0-4C15-B8B8-4CD6B90C9C4C}" sibTransId="{A65B454F-7082-441F-957D-C7FB662F5ACB}"/>
-    <dgm:cxn modelId="{50067FFC-99F6-4533-BAA1-E9B91FD2E091}" type="presOf" srcId="{0D5A3E99-91D6-446B-9A7F-EFE017E59D81}" destId="{71F43AB1-FD89-4BC9-BF4C-8C51E62B2039}" srcOrd="0" destOrd="3" presId="urn:microsoft.com/office/officeart/2005/8/layout/hProcess9"/>
-    <dgm:cxn modelId="{3AC4A382-B290-4381-90FA-1EEC906FF216}" type="presParOf" srcId="{226DD8DF-ADDF-43E2-8326-59F8CE4F1D2B}" destId="{67356863-DDC2-478E-B3F0-64EF76622992}" srcOrd="0" destOrd="0" presId="urn:microsoft.com/office/officeart/2005/8/layout/hProcess9"/>
-    <dgm:cxn modelId="{558C94F7-D46A-4879-8553-9606D256C06D}" type="presParOf" srcId="{226DD8DF-ADDF-43E2-8326-59F8CE4F1D2B}" destId="{E1ED0CCE-6577-4B30-8B1F-D1C85516E5D1}" srcOrd="1" destOrd="0" presId="urn:microsoft.com/office/officeart/2005/8/layout/hProcess9"/>
-    <dgm:cxn modelId="{D870282B-4B44-40BB-BD16-D0735CACF42A}" type="presParOf" srcId="{E1ED0CCE-6577-4B30-8B1F-D1C85516E5D1}" destId="{CF826550-DECD-43A9-BBC5-27C5DA3681FD}" srcOrd="0" destOrd="0" presId="urn:microsoft.com/office/officeart/2005/8/layout/hProcess9"/>
-    <dgm:cxn modelId="{E849BB43-DE1E-4BD2-8276-5DF399E225FF}" type="presParOf" srcId="{E1ED0CCE-6577-4B30-8B1F-D1C85516E5D1}" destId="{522D0509-E2FE-497D-91A7-3E29CDC33A46}" srcOrd="1" destOrd="0" presId="urn:microsoft.com/office/officeart/2005/8/layout/hProcess9"/>
-    <dgm:cxn modelId="{94CF0542-F29A-4945-9C60-E543EBF403B3}" type="presParOf" srcId="{E1ED0CCE-6577-4B30-8B1F-D1C85516E5D1}" destId="{71F43AB1-FD89-4BC9-BF4C-8C51E62B2039}" srcOrd="2" destOrd="0" presId="urn:microsoft.com/office/officeart/2005/8/layout/hProcess9"/>
-    <dgm:cxn modelId="{C4F48822-504C-4C8D-B1EA-871875457FE4}" type="presParOf" srcId="{E1ED0CCE-6577-4B30-8B1F-D1C85516E5D1}" destId="{4FCB3396-0149-415A-93C2-BFB5B9397104}" srcOrd="3" destOrd="0" presId="urn:microsoft.com/office/officeart/2005/8/layout/hProcess9"/>
-    <dgm:cxn modelId="{4132DABD-F4BB-4FB5-AB77-5AA65DA76254}" type="presParOf" srcId="{E1ED0CCE-6577-4B30-8B1F-D1C85516E5D1}" destId="{0535B7B9-03F3-4B8C-A3A2-F7664E6F080F}" srcOrd="4" destOrd="0" presId="urn:microsoft.com/office/officeart/2005/8/layout/hProcess9"/>
-  </dgm:cxnLst>
-  <dgm:bg/>
-  <dgm:whole/>
-  <dgm:extLst>
-    <a:ext uri="http://schemas.microsoft.com/office/drawing/2008/diagram">
-      <dsp:dataModelExt xmlns:dsp="http://schemas.microsoft.com/office/drawing/2008/diagram" relId="rId6" minVer="http://schemas.openxmlformats.org/drawingml/2006/diagram"/>
-    </a:ext>
-  </dgm:extLst>
-</dgm:dataModel>
-</file>
-
-<file path=ppt/diagrams/drawing1.xml><?xml version="1.0" encoding="utf-8"?>
-<dsp:drawing xmlns:dgm="http://schemas.openxmlformats.org/drawingml/2006/diagram" xmlns:dsp="http://schemas.microsoft.com/office/drawing/2008/diagram" xmlns:a="http://schemas.openxmlformats.org/drawingml/2006/main">
-  <dsp:spTree>
-    <dsp:nvGrpSpPr>
-      <dsp:cNvPr id="0" name=""/>
-      <dsp:cNvGrpSpPr/>
-    </dsp:nvGrpSpPr>
-    <dsp:grpSpPr/>
-    <dsp:sp modelId="{67356863-DDC2-478E-B3F0-64EF76622992}">
-      <dsp:nvSpPr>
-        <dsp:cNvPr id="0" name=""/>
-        <dsp:cNvSpPr/>
-      </dsp:nvSpPr>
-      <dsp:spPr>
-        <a:xfrm>
-          <a:off x="3" y="698281"/>
-          <a:ext cx="12191993" cy="5461436"/>
-        </a:xfrm>
-        <a:prstGeom prst="rightArrow">
-          <a:avLst/>
-        </a:prstGeom>
-        <a:solidFill>
-          <a:srgbClr val="288A8C"/>
-        </a:solidFill>
-        <a:ln>
-          <a:solidFill>
-            <a:schemeClr val="accent6">
-              <a:lumMod val="50000"/>
-            </a:schemeClr>
-          </a:solidFill>
-        </a:ln>
-        <a:effectLst/>
-      </dsp:spPr>
-      <dsp:style>
-        <a:lnRef idx="0">
-          <a:scrgbClr r="0" g="0" b="0"/>
-        </a:lnRef>
-        <a:fillRef idx="1">
-          <a:scrgbClr r="0" g="0" b="0"/>
-        </a:fillRef>
-        <a:effectRef idx="0">
-          <a:scrgbClr r="0" g="0" b="0"/>
-        </a:effectRef>
-        <a:fontRef idx="minor"/>
-      </dsp:style>
-    </dsp:sp>
-    <dsp:sp modelId="{CF826550-DECD-43A9-BBC5-27C5DA3681FD}">
-      <dsp:nvSpPr>
-        <dsp:cNvPr id="0" name=""/>
-        <dsp:cNvSpPr/>
-      </dsp:nvSpPr>
-      <dsp:spPr>
-        <a:xfrm>
-          <a:off x="9521" y="2223000"/>
-          <a:ext cx="3567480" cy="2412013"/>
-        </a:xfrm>
-        <a:prstGeom prst="roundRect">
-          <a:avLst/>
-        </a:prstGeom>
-        <a:solidFill>
-          <a:srgbClr val="FFC000"/>
-        </a:solidFill>
-        <a:ln w="12700" cap="flat" cmpd="sng" algn="ctr">
-          <a:solidFill>
-            <a:schemeClr val="lt1">
-              <a:hueOff val="0"/>
-              <a:satOff val="0"/>
-              <a:lumOff val="0"/>
-              <a:alphaOff val="0"/>
-            </a:schemeClr>
-          </a:solidFill>
-          <a:prstDash val="solid"/>
-          <a:miter lim="800000"/>
-        </a:ln>
-        <a:effectLst/>
-      </dsp:spPr>
-      <dsp:style>
-        <a:lnRef idx="2">
-          <a:scrgbClr r="0" g="0" b="0"/>
-        </a:lnRef>
-        <a:fillRef idx="1">
-          <a:scrgbClr r="0" g="0" b="0"/>
-        </a:fillRef>
-        <a:effectRef idx="0">
-          <a:scrgbClr r="0" g="0" b="0"/>
-        </a:effectRef>
-        <a:fontRef idx="minor">
-          <a:schemeClr val="lt1"/>
-        </a:fontRef>
-      </dsp:style>
-      <dsp:txBody>
-        <a:bodyPr spcFirstLastPara="0" vert="horz" wrap="square" lIns="121920" tIns="121920" rIns="121920" bIns="121920" numCol="1" spcCol="1270" anchor="t" anchorCtr="0">
-          <a:noAutofit/>
-        </a:bodyPr>
-        <a:lstStyle/>
-        <a:p>
-          <a:pPr marL="0" lvl="0" indent="0" algn="l" defTabSz="1422400">
-            <a:lnSpc>
-              <a:spcPct val="90000"/>
-            </a:lnSpc>
-            <a:spcBef>
-              <a:spcPct val="0"/>
-            </a:spcBef>
-            <a:spcAft>
-              <a:spcPct val="35000"/>
-            </a:spcAft>
-            <a:buNone/>
-          </a:pPr>
-          <a:r>
-            <a:rPr lang="es-ES" sz="3200" kern="1200" dirty="0">
-              <a:solidFill>
-                <a:srgbClr val="002060"/>
-              </a:solidFill>
-            </a:rPr>
-            <a:t>(i) </a:t>
-          </a:r>
-          <a:r>
-            <a:rPr lang="es-ES" sz="3200" kern="1200" dirty="0" err="1">
-              <a:solidFill>
-                <a:srgbClr val="002060"/>
-              </a:solidFill>
-            </a:rPr>
-            <a:t>Semivariogram</a:t>
-          </a:r>
-          <a:endParaRPr lang="es-ES" sz="3200" kern="1200" dirty="0">
-            <a:solidFill>
-              <a:srgbClr val="002060"/>
-            </a:solidFill>
-          </a:endParaRPr>
-        </a:p>
-        <a:p>
-          <a:pPr marL="228600" lvl="1" indent="-228600" algn="l" defTabSz="1066800">
-            <a:lnSpc>
-              <a:spcPct val="90000"/>
-            </a:lnSpc>
-            <a:spcBef>
-              <a:spcPct val="0"/>
-            </a:spcBef>
-            <a:spcAft>
-              <a:spcPct val="15000"/>
-            </a:spcAft>
-            <a:buChar char="•"/>
-          </a:pPr>
-          <a:r>
-            <a:rPr lang="es-ES" sz="2400" kern="1200" dirty="0" err="1">
-              <a:solidFill>
-                <a:srgbClr val="002060"/>
-              </a:solidFill>
-            </a:rPr>
-            <a:t>Detection</a:t>
-          </a:r>
-          <a:r>
-            <a:rPr lang="es-ES" sz="2400" kern="1200" dirty="0">
-              <a:solidFill>
-                <a:srgbClr val="002060"/>
-              </a:solidFill>
-            </a:rPr>
-            <a:t> </a:t>
-          </a:r>
-          <a:r>
-            <a:rPr lang="es-ES" sz="2400" kern="1200" dirty="0" err="1">
-              <a:solidFill>
-                <a:srgbClr val="002060"/>
-              </a:solidFill>
-            </a:rPr>
-            <a:t>of</a:t>
-          </a:r>
-          <a:r>
-            <a:rPr lang="es-ES" sz="2400" kern="1200" dirty="0">
-              <a:solidFill>
-                <a:srgbClr val="002060"/>
-              </a:solidFill>
-            </a:rPr>
-            <a:t> </a:t>
-          </a:r>
-          <a:r>
-            <a:rPr lang="es-ES" sz="2400" kern="1200" dirty="0" err="1">
-              <a:solidFill>
-                <a:srgbClr val="002060"/>
-              </a:solidFill>
-            </a:rPr>
-            <a:t>spatial</a:t>
-          </a:r>
-          <a:r>
-            <a:rPr lang="es-ES" sz="2400" kern="1200" dirty="0">
-              <a:solidFill>
-                <a:srgbClr val="002060"/>
-              </a:solidFill>
-            </a:rPr>
-            <a:t> </a:t>
-          </a:r>
-          <a:r>
-            <a:rPr lang="es-ES" sz="2400" kern="1200" dirty="0" err="1">
-              <a:solidFill>
-                <a:srgbClr val="002060"/>
-              </a:solidFill>
-            </a:rPr>
-            <a:t>dependence</a:t>
-          </a:r>
-          <a:endParaRPr lang="es-ES" sz="2400" kern="1200" dirty="0">
-            <a:solidFill>
-              <a:srgbClr val="002060"/>
-            </a:solidFill>
-          </a:endParaRPr>
-        </a:p>
-        <a:p>
-          <a:pPr marL="228600" lvl="1" indent="-228600" algn="l" defTabSz="1066800">
-            <a:lnSpc>
-              <a:spcPct val="90000"/>
-            </a:lnSpc>
-            <a:spcBef>
-              <a:spcPct val="0"/>
-            </a:spcBef>
-            <a:spcAft>
-              <a:spcPct val="15000"/>
-            </a:spcAft>
-            <a:buChar char="•"/>
-          </a:pPr>
-          <a:r>
-            <a:rPr lang="es-ES" sz="2400" kern="1200" dirty="0" err="1">
-              <a:solidFill>
-                <a:srgbClr val="002060"/>
-              </a:solidFill>
-            </a:rPr>
-            <a:t>Range</a:t>
-          </a:r>
-          <a:endParaRPr lang="es-ES" sz="2400" kern="1200" dirty="0">
-            <a:solidFill>
-              <a:srgbClr val="002060"/>
-            </a:solidFill>
-          </a:endParaRPr>
-        </a:p>
-        <a:p>
-          <a:pPr marL="228600" lvl="1" indent="-228600" algn="l" defTabSz="1066800">
-            <a:lnSpc>
-              <a:spcPct val="90000"/>
-            </a:lnSpc>
-            <a:spcBef>
-              <a:spcPct val="0"/>
-            </a:spcBef>
-            <a:spcAft>
-              <a:spcPct val="15000"/>
-            </a:spcAft>
-            <a:buChar char="•"/>
-          </a:pPr>
-          <a:endParaRPr lang="es-ES" sz="2400" kern="1200" dirty="0">
-            <a:solidFill>
-              <a:srgbClr val="002060"/>
-            </a:solidFill>
-          </a:endParaRPr>
-        </a:p>
-      </dsp:txBody>
-      <dsp:txXfrm>
-        <a:off x="127266" y="2340745"/>
-        <a:ext cx="3331990" cy="2176523"/>
-      </dsp:txXfrm>
-    </dsp:sp>
-    <dsp:sp modelId="{71F43AB1-FD89-4BC9-BF4C-8C51E62B2039}">
-      <dsp:nvSpPr>
-        <dsp:cNvPr id="0" name=""/>
-        <dsp:cNvSpPr/>
-      </dsp:nvSpPr>
-      <dsp:spPr>
-        <a:xfrm>
-          <a:off x="3655251" y="2223000"/>
-          <a:ext cx="4216321" cy="2412013"/>
-        </a:xfrm>
-        <a:prstGeom prst="roundRect">
-          <a:avLst/>
-        </a:prstGeom>
-        <a:solidFill>
-          <a:srgbClr val="FFC000"/>
-        </a:solidFill>
-        <a:ln w="12700" cap="flat" cmpd="sng" algn="ctr">
-          <a:solidFill>
-            <a:schemeClr val="lt1">
-              <a:hueOff val="0"/>
-              <a:satOff val="0"/>
-              <a:lumOff val="0"/>
-              <a:alphaOff val="0"/>
-            </a:schemeClr>
-          </a:solidFill>
-          <a:prstDash val="solid"/>
-          <a:miter lim="800000"/>
-        </a:ln>
-        <a:effectLst/>
-      </dsp:spPr>
-      <dsp:style>
-        <a:lnRef idx="2">
-          <a:scrgbClr r="0" g="0" b="0"/>
-        </a:lnRef>
-        <a:fillRef idx="1">
-          <a:scrgbClr r="0" g="0" b="0"/>
-        </a:fillRef>
-        <a:effectRef idx="0">
-          <a:scrgbClr r="0" g="0" b="0"/>
-        </a:effectRef>
-        <a:fontRef idx="minor">
-          <a:schemeClr val="lt1"/>
-        </a:fontRef>
-      </dsp:style>
-      <dsp:txBody>
-        <a:bodyPr spcFirstLastPara="0" vert="horz" wrap="square" lIns="121920" tIns="121920" rIns="121920" bIns="121920" numCol="1" spcCol="1270" anchor="t" anchorCtr="0">
-          <a:noAutofit/>
-        </a:bodyPr>
-        <a:lstStyle/>
-        <a:p>
-          <a:pPr marL="0" lvl="0" indent="0" algn="l" defTabSz="1422400">
-            <a:lnSpc>
-              <a:spcPct val="90000"/>
-            </a:lnSpc>
-            <a:spcBef>
-              <a:spcPct val="0"/>
-            </a:spcBef>
-            <a:spcAft>
-              <a:spcPct val="35000"/>
-            </a:spcAft>
-            <a:buNone/>
-          </a:pPr>
-          <a:r>
-            <a:rPr lang="es-ES" sz="3200" kern="1200" dirty="0">
-              <a:solidFill>
-                <a:srgbClr val="002060"/>
-              </a:solidFill>
-            </a:rPr>
-            <a:t>(</a:t>
-          </a:r>
-          <a:r>
-            <a:rPr lang="es-ES" sz="3200" kern="1200" dirty="0" err="1">
-              <a:solidFill>
-                <a:srgbClr val="002060"/>
-              </a:solidFill>
-            </a:rPr>
-            <a:t>ii</a:t>
-          </a:r>
-          <a:r>
-            <a:rPr lang="es-ES" sz="3200" kern="1200" dirty="0">
-              <a:solidFill>
-                <a:srgbClr val="002060"/>
-              </a:solidFill>
-            </a:rPr>
-            <a:t>) </a:t>
-          </a:r>
-          <a:r>
-            <a:rPr lang="es-ES" sz="3200" kern="1200" dirty="0" err="1">
-              <a:solidFill>
-                <a:srgbClr val="002060"/>
-              </a:solidFill>
-            </a:rPr>
-            <a:t>sPCA</a:t>
-          </a:r>
-          <a:endParaRPr lang="es-ES" sz="3200" kern="1200" dirty="0">
-            <a:solidFill>
-              <a:srgbClr val="002060"/>
-            </a:solidFill>
-          </a:endParaRPr>
-        </a:p>
-        <a:p>
-          <a:pPr marL="228600" lvl="1" indent="-228600" algn="l" defTabSz="1066800">
-            <a:lnSpc>
-              <a:spcPct val="90000"/>
-            </a:lnSpc>
-            <a:spcBef>
-              <a:spcPct val="0"/>
-            </a:spcBef>
-            <a:spcAft>
-              <a:spcPct val="15000"/>
-            </a:spcAft>
-            <a:buChar char="•"/>
-          </a:pPr>
-          <a:r>
-            <a:rPr lang="es-ES" sz="2400" kern="1200" dirty="0" err="1">
-              <a:solidFill>
-                <a:srgbClr val="002060"/>
-              </a:solidFill>
-            </a:rPr>
-            <a:t>Moran’s</a:t>
-          </a:r>
-          <a:r>
-            <a:rPr lang="es-ES" sz="2400" kern="1200" dirty="0">
-              <a:solidFill>
-                <a:srgbClr val="002060"/>
-              </a:solidFill>
-            </a:rPr>
-            <a:t> I</a:t>
-          </a:r>
-        </a:p>
-        <a:p>
-          <a:pPr marL="228600" lvl="1" indent="-228600" algn="l" defTabSz="1066800">
-            <a:lnSpc>
-              <a:spcPct val="90000"/>
-            </a:lnSpc>
-            <a:spcBef>
-              <a:spcPct val="0"/>
-            </a:spcBef>
-            <a:spcAft>
-              <a:spcPct val="15000"/>
-            </a:spcAft>
-            <a:buChar char="•"/>
-          </a:pPr>
-          <a:r>
-            <a:rPr lang="es-ES" sz="2400" kern="1200" dirty="0" err="1">
-              <a:solidFill>
-                <a:srgbClr val="002060"/>
-              </a:solidFill>
-            </a:rPr>
-            <a:t>Optimization</a:t>
-          </a:r>
-          <a:r>
-            <a:rPr lang="es-ES" sz="2400" kern="1200" dirty="0">
-              <a:solidFill>
-                <a:srgbClr val="002060"/>
-              </a:solidFill>
-            </a:rPr>
-            <a:t> in</a:t>
-          </a:r>
-        </a:p>
-        <a:p>
-          <a:pPr marL="228600" lvl="1" indent="-228600" algn="l" defTabSz="1066800">
-            <a:lnSpc>
-              <a:spcPct val="90000"/>
-            </a:lnSpc>
-            <a:spcBef>
-              <a:spcPct val="0"/>
-            </a:spcBef>
-            <a:spcAft>
-              <a:spcPct val="15000"/>
-            </a:spcAft>
-            <a:buNone/>
-          </a:pPr>
-          <a:r>
-            <a:rPr lang="es-ES" sz="2400" kern="1200" dirty="0">
-              <a:solidFill>
-                <a:srgbClr val="002060"/>
-              </a:solidFill>
-            </a:rPr>
-            <a:t>   10-multidimensional </a:t>
-          </a:r>
-          <a:r>
-            <a:rPr lang="es-ES" sz="2400" kern="1200" dirty="0" err="1">
-              <a:solidFill>
-                <a:srgbClr val="002060"/>
-              </a:solidFill>
-            </a:rPr>
-            <a:t>space</a:t>
-          </a:r>
-          <a:endParaRPr lang="es-ES" sz="2400" kern="1200" dirty="0">
-            <a:solidFill>
-              <a:srgbClr val="002060"/>
-            </a:solidFill>
-          </a:endParaRPr>
-        </a:p>
-      </dsp:txBody>
-      <dsp:txXfrm>
-        <a:off x="3772996" y="2340745"/>
-        <a:ext cx="3980831" cy="2176523"/>
-      </dsp:txXfrm>
-    </dsp:sp>
-    <dsp:sp modelId="{0535B7B9-03F3-4B8C-A3A2-F7664E6F080F}">
-      <dsp:nvSpPr>
-        <dsp:cNvPr id="0" name=""/>
-        <dsp:cNvSpPr/>
-      </dsp:nvSpPr>
-      <dsp:spPr>
-        <a:xfrm>
-          <a:off x="7896597" y="2223000"/>
-          <a:ext cx="3631917" cy="2412013"/>
-        </a:xfrm>
-        <a:prstGeom prst="roundRect">
-          <a:avLst/>
-        </a:prstGeom>
-        <a:solidFill>
-          <a:srgbClr val="FFC000"/>
-        </a:solidFill>
-        <a:ln w="12700" cap="flat" cmpd="sng" algn="ctr">
-          <a:solidFill>
-            <a:schemeClr val="lt1">
-              <a:hueOff val="0"/>
-              <a:satOff val="0"/>
-              <a:lumOff val="0"/>
-              <a:alphaOff val="0"/>
-            </a:schemeClr>
-          </a:solidFill>
-          <a:prstDash val="solid"/>
-          <a:miter lim="800000"/>
-        </a:ln>
-        <a:effectLst/>
-      </dsp:spPr>
-      <dsp:style>
-        <a:lnRef idx="2">
-          <a:scrgbClr r="0" g="0" b="0"/>
-        </a:lnRef>
-        <a:fillRef idx="1">
-          <a:scrgbClr r="0" g="0" b="0"/>
-        </a:fillRef>
-        <a:effectRef idx="0">
-          <a:scrgbClr r="0" g="0" b="0"/>
-        </a:effectRef>
-        <a:fontRef idx="minor">
-          <a:schemeClr val="lt1"/>
-        </a:fontRef>
-      </dsp:style>
-      <dsp:txBody>
-        <a:bodyPr spcFirstLastPara="0" vert="horz" wrap="square" lIns="121920" tIns="121920" rIns="121920" bIns="121920" numCol="1" spcCol="1270" anchor="t" anchorCtr="0">
-          <a:noAutofit/>
-        </a:bodyPr>
-        <a:lstStyle/>
-        <a:p>
-          <a:pPr marL="0" lvl="0" indent="0" algn="l" defTabSz="1422400">
-            <a:lnSpc>
-              <a:spcPct val="90000"/>
-            </a:lnSpc>
-            <a:spcBef>
-              <a:spcPct val="0"/>
-            </a:spcBef>
-            <a:spcAft>
-              <a:spcPct val="35000"/>
-            </a:spcAft>
-            <a:buNone/>
-          </a:pPr>
-          <a:r>
-            <a:rPr lang="es-ES" sz="3200" kern="1200" dirty="0">
-              <a:solidFill>
-                <a:srgbClr val="002060"/>
-              </a:solidFill>
-            </a:rPr>
-            <a:t>(</a:t>
-          </a:r>
-          <a:r>
-            <a:rPr lang="es-ES" sz="3200" kern="1200" dirty="0" err="1">
-              <a:solidFill>
-                <a:srgbClr val="002060"/>
-              </a:solidFill>
-            </a:rPr>
-            <a:t>iii</a:t>
-          </a:r>
-          <a:r>
-            <a:rPr lang="es-ES" sz="3200" kern="1200" dirty="0">
-              <a:solidFill>
-                <a:srgbClr val="002060"/>
-              </a:solidFill>
-            </a:rPr>
-            <a:t>) </a:t>
-          </a:r>
-          <a:r>
-            <a:rPr lang="es-ES" sz="3200" kern="1200" dirty="0" err="1">
-              <a:solidFill>
-                <a:srgbClr val="002060"/>
-              </a:solidFill>
-            </a:rPr>
-            <a:t>sDRI</a:t>
-          </a:r>
-          <a:endParaRPr lang="es-ES" sz="3200" kern="1200" dirty="0">
-            <a:solidFill>
-              <a:srgbClr val="002060"/>
-            </a:solidFill>
-          </a:endParaRPr>
-        </a:p>
-        <a:p>
-          <a:pPr marL="228600" lvl="1" indent="-228600" algn="l" defTabSz="1066800">
-            <a:lnSpc>
-              <a:spcPct val="90000"/>
-            </a:lnSpc>
-            <a:spcBef>
-              <a:spcPct val="0"/>
-            </a:spcBef>
-            <a:spcAft>
-              <a:spcPct val="15000"/>
-            </a:spcAft>
-            <a:buChar char="•"/>
-          </a:pPr>
-          <a:r>
-            <a:rPr lang="en-US" sz="2400" kern="1200" dirty="0">
-              <a:solidFill>
-                <a:srgbClr val="002060"/>
-              </a:solidFill>
-            </a:rPr>
-            <a:t>Extraction of first principal component</a:t>
-          </a:r>
-          <a:endParaRPr lang="es-ES" sz="2400" kern="1200" dirty="0">
-            <a:solidFill>
-              <a:srgbClr val="002060"/>
-            </a:solidFill>
-          </a:endParaRPr>
-        </a:p>
-        <a:p>
-          <a:pPr marL="228600" lvl="1" indent="-228600" algn="l" defTabSz="1066800">
-            <a:lnSpc>
-              <a:spcPct val="90000"/>
-            </a:lnSpc>
-            <a:spcBef>
-              <a:spcPct val="0"/>
-            </a:spcBef>
-            <a:spcAft>
-              <a:spcPct val="15000"/>
-            </a:spcAft>
-            <a:buChar char="•"/>
-          </a:pPr>
-          <a:r>
-            <a:rPr lang="en-US" sz="2400" kern="1200" dirty="0">
-              <a:solidFill>
-                <a:srgbClr val="002060"/>
-              </a:solidFill>
-            </a:rPr>
-            <a:t>Scaling from 0 to 100</a:t>
-          </a:r>
-          <a:endParaRPr lang="es-ES" sz="2400" kern="1200" dirty="0">
-            <a:solidFill>
-              <a:srgbClr val="002060"/>
-            </a:solidFill>
-          </a:endParaRPr>
-        </a:p>
-        <a:p>
-          <a:pPr marL="228600" lvl="1" indent="-228600" algn="l" defTabSz="1066800">
-            <a:lnSpc>
-              <a:spcPct val="90000"/>
-            </a:lnSpc>
-            <a:spcBef>
-              <a:spcPct val="0"/>
-            </a:spcBef>
-            <a:spcAft>
-              <a:spcPct val="15000"/>
-            </a:spcAft>
-            <a:buChar char="•"/>
-          </a:pPr>
-          <a:r>
-            <a:rPr lang="es-ES" sz="2400" kern="1200" dirty="0" err="1">
-              <a:solidFill>
-                <a:srgbClr val="002060"/>
-              </a:solidFill>
-            </a:rPr>
-            <a:t>Mapping</a:t>
-          </a:r>
-          <a:endParaRPr lang="es-ES" sz="2400" kern="1200" dirty="0">
-            <a:solidFill>
-              <a:srgbClr val="002060"/>
-            </a:solidFill>
-          </a:endParaRPr>
-        </a:p>
-        <a:p>
-          <a:pPr marL="285750" lvl="1" indent="-285750" algn="l" defTabSz="1600200">
-            <a:lnSpc>
-              <a:spcPct val="90000"/>
-            </a:lnSpc>
-            <a:spcBef>
-              <a:spcPct val="0"/>
-            </a:spcBef>
-            <a:spcAft>
-              <a:spcPct val="15000"/>
-            </a:spcAft>
-            <a:buChar char="•"/>
-          </a:pPr>
-          <a:endParaRPr lang="es-ES" sz="3600" kern="1200" dirty="0">
-            <a:solidFill>
-              <a:srgbClr val="002060"/>
-            </a:solidFill>
-          </a:endParaRPr>
-        </a:p>
-      </dsp:txBody>
-      <dsp:txXfrm>
-        <a:off x="8014342" y="2340745"/>
-        <a:ext cx="3396427" cy="2176523"/>
-      </dsp:txXfrm>
-    </dsp:sp>
-  </dsp:spTree>
-</dsp:drawing>
-</file>
-
-<file path=ppt/diagrams/layout1.xml><?xml version="1.0" encoding="utf-8"?>
-<dgm:layoutDef xmlns:dgm="http://schemas.openxmlformats.org/drawingml/2006/diagram" xmlns:a="http://schemas.openxmlformats.org/drawingml/2006/main" uniqueId="urn:microsoft.com/office/officeart/2005/8/layout/hProcess9">
-  <dgm:title val=""/>
-  <dgm:desc val=""/>
-  <dgm:catLst>
-    <dgm:cat type="process" pri="5000"/>
-    <dgm:cat type="convert" pri="13000"/>
-  </dgm:catLst>
-  <dgm:sampData useDef="1">
-    <dgm:dataModel>
-      <dgm:ptLst/>
-      <dgm:bg/>
-      <dgm:whole/>
-    </dgm:dataModel>
-  </dgm:sampData>
-  <dgm:styleData>
-    <dgm:dataModel>
-      <dgm:ptLst>
-        <dgm:pt modelId="0" type="doc"/>
-        <dgm:pt modelId="1"/>
-        <dgm:pt modelId="2"/>
-      </dgm:ptLst>
-      <dgm:cxnLst>
-        <dgm:cxn modelId="3" srcId="0" destId="1" srcOrd="0" destOrd="0"/>
-        <dgm:cxn modelId="4" srcId="0" destId="2" srcOrd="1" destOrd="0"/>
-      </dgm:cxnLst>
-      <dgm:bg/>
-      <dgm:whole/>
-    </dgm:dataModel>
-  </dgm:styleData>
-  <dgm:clrData>
-    <dgm:dataModel>
-      <dgm:ptLst>
-        <dgm:pt modelId="0" type="doc"/>
-        <dgm:pt modelId="1"/>
-        <dgm:pt modelId="2"/>
-        <dgm:pt modelId="3"/>
-        <dgm:pt modelId="4"/>
-      </dgm:ptLst>
-      <dgm:cxnLst>
-        <dgm:cxn modelId="5" srcId="0" destId="1" srcOrd="0" destOrd="0"/>
-        <dgm:cxn modelId="6" srcId="0" destId="2" srcOrd="1" destOrd="0"/>
-        <dgm:cxn modelId="7" srcId="0" destId="3" srcOrd="2" destOrd="0"/>
-        <dgm:cxn modelId="8" srcId="0" destId="4" srcOrd="3" destOrd="0"/>
-      </dgm:cxnLst>
-      <dgm:bg/>
-      <dgm:whole/>
-    </dgm:dataModel>
-  </dgm:clrData>
-  <dgm:layoutNode name="CompostProcess">
-    <dgm:varLst>
-      <dgm:dir/>
-      <dgm:resizeHandles val="exact"/>
-    </dgm:varLst>
-    <dgm:alg type="composite">
-      <dgm:param type="horzAlign" val="ctr"/>
-      <dgm:param type="vertAlign" val="mid"/>
-    </dgm:alg>
-    <dgm:shape xmlns:r="http://schemas.openxmlformats.org/officeDocument/2006/relationships" r:blip="">
-      <dgm:adjLst/>
-    </dgm:shape>
-    <dgm:presOf/>
-    <dgm:constrLst>
-      <dgm:constr type="w" for="ch" forName="arrow" refType="w" fact="0.85"/>
-      <dgm:constr type="h" for="ch" forName="arrow" refType="h"/>
-      <dgm:constr type="ctrX" for="ch" forName="arrow" refType="w" fact="0.5"/>
-      <dgm:constr type="ctrY" for="ch" forName="arrow" refType="h" fact="0.5"/>
-      <dgm:constr type="w" for="ch" forName="linearProcess" refType="w"/>
-      <dgm:constr type="h" for="ch" forName="linearProcess" refType="h" fact="0.4"/>
-      <dgm:constr type="ctrX" for="ch" forName="linearProcess" refType="w" fact="0.5"/>
-      <dgm:constr type="ctrY" for="ch" forName="linearProcess" refType="h" fact="0.5"/>
-    </dgm:constrLst>
-    <dgm:ruleLst/>
-    <dgm:layoutNode name="arrow" styleLbl="bgShp">
-      <dgm:alg type="sp"/>
-      <dgm:choose name="Name0">
-        <dgm:if name="Name1" func="var" arg="dir" op="equ" val="norm">
-          <dgm:shape xmlns:r="http://schemas.openxmlformats.org/officeDocument/2006/relationships" type="rightArrow" r:blip="">
-            <dgm:adjLst/>
-          </dgm:shape>
-        </dgm:if>
-        <dgm:else name="Name2">
-          <dgm:shape xmlns:r="http://schemas.openxmlformats.org/officeDocument/2006/relationships" type="leftArrow" r:blip="">
-            <dgm:adjLst/>
-          </dgm:shape>
-        </dgm:else>
-      </dgm:choose>
-      <dgm:presOf/>
-      <dgm:constrLst/>
-      <dgm:ruleLst/>
-    </dgm:layoutNode>
-    <dgm:layoutNode name="linearProcess">
-      <dgm:choose name="Name3">
-        <dgm:if name="Name4" func="var" arg="dir" op="equ" val="norm">
-          <dgm:alg type="lin"/>
-        </dgm:if>
-        <dgm:else name="Name5">
-          <dgm:alg type="lin">
-            <dgm:param type="linDir" val="fromR"/>
-          </dgm:alg>
-        </dgm:else>
-      </dgm:choose>
-      <dgm:shape xmlns:r="http://schemas.openxmlformats.org/officeDocument/2006/relationships" r:blip="">
-        <dgm:adjLst/>
-      </dgm:shape>
-      <dgm:presOf/>
-      <dgm:constrLst>
-        <dgm:constr type="userA" for="ch" ptType="node" refType="w"/>
-        <dgm:constr type="h" for="ch" ptType="node" refType="h"/>
-        <dgm:constr type="w" for="ch" ptType="node" op="equ"/>
-        <dgm:constr type="w" for="ch" forName="sibTrans" refType="w" fact="0.05"/>
-        <dgm:constr type="primFontSz" for="ch" ptType="node" op="equ" val="65"/>
-      </dgm:constrLst>
-      <dgm:ruleLst/>
-      <dgm:forEach name="Name6" axis="ch" ptType="node">
-        <dgm:layoutNode name="textNode" styleLbl="node1">
-          <dgm:varLst>
-            <dgm:bulletEnabled val="1"/>
-          </dgm:varLst>
-          <dgm:alg type="tx"/>
-          <dgm:shape xmlns:r="http://schemas.openxmlformats.org/officeDocument/2006/relationships" type="roundRect" r:blip="">
-            <dgm:adjLst/>
-          </dgm:shape>
-          <dgm:presOf axis="desOrSelf" ptType="node"/>
-          <dgm:constrLst>
-            <dgm:constr type="userA"/>
-            <dgm:constr type="w" refType="userA" fact="0.3"/>
-            <dgm:constr type="tMarg" refType="primFontSz" fact="0.3"/>
-            <dgm:constr type="bMarg" refType="primFontSz" fact="0.3"/>
-            <dgm:constr type="lMarg" refType="primFontSz" fact="0.3"/>
-            <dgm:constr type="rMarg" refType="primFontSz" fact="0.3"/>
-          </dgm:constrLst>
-          <dgm:ruleLst>
-            <dgm:rule type="w" val="NaN" fact="1" max="NaN"/>
-            <dgm:rule type="primFontSz" val="5" fact="NaN" max="NaN"/>
-          </dgm:ruleLst>
-        </dgm:layoutNode>
-        <dgm:forEach name="Name7" axis="followSib" ptType="sibTrans" cnt="1">
-          <dgm:layoutNode name="sibTrans">
-            <dgm:alg type="sp"/>
-            <dgm:shape xmlns:r="http://schemas.openxmlformats.org/officeDocument/2006/relationships" r:blip="">
-              <dgm:adjLst/>
-            </dgm:shape>
-            <dgm:presOf/>
-            <dgm:constrLst/>
-            <dgm:ruleLst/>
-          </dgm:layoutNode>
-        </dgm:forEach>
-      </dgm:forEach>
-    </dgm:layoutNode>
-  </dgm:layoutNode>
-</dgm:layoutDef>
-</file>
-
-<file path=ppt/diagrams/quickStyle1.xml><?xml version="1.0" encoding="utf-8"?>
-<dgm:styleDef xmlns:dgm="http://schemas.openxmlformats.org/drawingml/2006/diagram" xmlns:a="http://schemas.openxmlformats.org/drawingml/2006/main" uniqueId="urn:microsoft.com/office/officeart/2005/8/quickstyle/simple1">
-  <dgm:title val=""/>
-  <dgm:desc val=""/>
-  <dgm:catLst>
-    <dgm:cat type="simple" pri="10100"/>
-  </dgm:catLst>
-  <dgm:scene3d>
-    <a:camera prst="orthographicFront"/>
-    <a:lightRig rig="threePt" dir="t"/>
-  </dgm:scene3d>
-  <dgm:styleLbl name="node0">
-    <dgm:scene3d>
-      <a:camera prst="orthographicFront"/>
-      <a:lightRig rig="threePt" dir="t"/>
-    </dgm:scene3d>
-    <dgm:sp3d/>
-    <dgm:txPr/>
-    <dgm:style>
-      <a:lnRef idx="2">
-        <a:scrgbClr r="0" g="0" b="0"/>
-      </a:lnRef>
-      <a:fillRef idx="1">
-        <a:scrgbClr r="0" g="0" b="0"/>
-      </a:fillRef>
-      <a:effectRef idx="0">
-        <a:scrgbClr r="0" g="0" b="0"/>
-      </a:effectRef>
-      <a:fontRef idx="minor">
-        <a:schemeClr val="lt1"/>
-      </a:fontRef>
-    </dgm:style>
-  </dgm:styleLbl>
-  <dgm:styleLbl name="lnNode1">
-    <dgm:scene3d>
-      <a:camera prst="orthographicFront"/>
-      <a:lightRig rig="threePt" dir="t"/>
-    </dgm:scene3d>
-    <dgm:sp3d/>
-    <dgm:txPr/>
-    <dgm:style>
-      <a:lnRef idx="2">
-        <a:scrgbClr r="0" g="0" b="0"/>
-      </a:lnRef>
-      <a:fillRef idx="1">
-        <a:scrgbClr r="0" g="0" b="0"/>
-      </a:fillRef>
-      <a:effectRef idx="0">
-        <a:scrgbClr r="0" g="0" b="0"/>
-      </a:effectRef>
-      <a:fontRef idx="minor">
-        <a:schemeClr val="lt1"/>
-      </a:fontRef>
-    </dgm:style>
-  </dgm:styleLbl>
-  <dgm:styleLbl name="vennNode1">
-    <dgm:scene3d>
-      <a:camera prst="orthographicFront"/>
-      <a:lightRig rig="threePt" dir="t"/>
-    </dgm:scene3d>
-    <dgm:sp3d/>
-    <dgm:txPr/>
-    <dgm:style>
-      <a:lnRef idx="2">
-        <a:scrgbClr r="0" g="0" b="0"/>
-      </a:lnRef>
-      <a:fillRef idx="1">
-        <a:scrgbClr r="0" g="0" b="0"/>
-      </a:fillRef>
-      <a:effectRef idx="0">
-        <a:scrgbClr r="0" g="0" b="0"/>
-      </a:effectRef>
-      <a:fontRef idx="minor">
-        <a:schemeClr val="tx1"/>
-      </a:fontRef>
-    </dgm:style>
-  </dgm:styleLbl>
-  <dgm:styleLbl name="alignNode1">
-    <dgm:scene3d>
-      <a:camera prst="orthographicFront"/>
-      <a:lightRig rig="threePt" dir="t"/>
-    </dgm:scene3d>
-    <dgm:sp3d/>
-    <dgm:txPr/>
-    <dgm:style>
-      <a:lnRef idx="2">
-        <a:scrgbClr r="0" g="0" b="0"/>
-      </a:lnRef>
-      <a:fillRef idx="1">
-        <a:scrgbClr r="0" g="0" b="0"/>
-      </a:fillRef>
-      <a:effectRef idx="0">
-        <a:scrgbClr r="0" g="0" b="0"/>
-      </a:effectRef>
-      <a:fontRef idx="minor">
-        <a:schemeClr val="lt1"/>
-      </a:fontRef>
-    </dgm:style>
-  </dgm:styleLbl>
-  <dgm:styleLbl name="node1">
-    <dgm:scene3d>
-      <a:camera prst="orthographicFront"/>
-      <a:lightRig rig="threePt" dir="t"/>
-    </dgm:scene3d>
-    <dgm:sp3d/>
-    <dgm:txPr/>
-    <dgm:style>
-      <a:lnRef idx="2">
-        <a:scrgbClr r="0" g="0" b="0"/>
-      </a:lnRef>
-      <a:fillRef idx="1">
-        <a:scrgbClr r="0" g="0" b="0"/>
-      </a:fillRef>
-      <a:effectRef idx="0">
-        <a:scrgbClr r="0" g="0" b="0"/>
-      </a:effectRef>
-      <a:fontRef idx="minor">
-        <a:schemeClr val="lt1"/>
-      </a:fontRef>
-    </dgm:style>
-  </dgm:styleLbl>
-  <dgm:styleLbl name="node2">
-    <dgm:scene3d>
-      <a:camera prst="orthographicFront"/>
-      <a:lightRig rig="threePt" dir="t"/>
-    </dgm:scene3d>
-    <dgm:sp3d/>
-    <dgm:txPr/>
-    <dgm:style>
-      <a:lnRef idx="2">
-        <a:scrgbClr r="0" g="0" b="0"/>
-      </a:lnRef>
-      <a:fillRef idx="1">
-        <a:scrgbClr r="0" g="0" b="0"/>
-      </a:fillRef>
-      <a:effectRef idx="0">
-        <a:scrgbClr r="0" g="0" b="0"/>
-      </a:effectRef>
-      <a:fontRef idx="minor">
-        <a:schemeClr val="lt1"/>
-      </a:fontRef>
-    </dgm:style>
-  </dgm:styleLbl>
-  <dgm:styleLbl name="node3">
-    <dgm:scene3d>
-      <a:camera prst="orthographicFront"/>
-      <a:lightRig rig="threePt" dir="t"/>
-    </dgm:scene3d>
-    <dgm:sp3d/>
-    <dgm:txPr/>
-    <dgm:style>
-      <a:lnRef idx="2">
-        <a:scrgbClr r="0" g="0" b="0"/>
-      </a:lnRef>
-      <a:fillRef idx="1">
-        <a:scrgbClr r="0" g="0" b="0"/>
-      </a:fillRef>
-      <a:effectRef idx="0">
-        <a:scrgbClr r="0" g="0" b="0"/>
-      </a:effectRef>
-      <a:fontRef idx="minor">
-        <a:schemeClr val="lt1"/>
-      </a:fontRef>
-    </dgm:style>
-  </dgm:styleLbl>
-  <dgm:styleLbl name="node4">
-    <dgm:scene3d>
-      <a:camera prst="orthographicFront"/>
-      <a:lightRig rig="threePt" dir="t"/>
-    </dgm:scene3d>
-    <dgm:sp3d/>
-    <dgm:txPr/>
-    <dgm:style>
-      <a:lnRef idx="2">
-        <a:scrgbClr r="0" g="0" b="0"/>
-      </a:lnRef>
-      <a:fillRef idx="1">
-        <a:scrgbClr r="0" g="0" b="0"/>
-      </a:fillRef>
-      <a:effectRef idx="0">
-        <a:scrgbClr r="0" g="0" b="0"/>
-      </a:effectRef>
-      <a:fontRef idx="minor">
-        <a:schemeClr val="lt1"/>
-      </a:fontRef>
-    </dgm:style>
-  </dgm:styleLbl>
-  <dgm:styleLbl name="fgImgPlace1">
-    <dgm:scene3d>
-      <a:camera prst="orthographicFront"/>
-      <a:lightRig rig="threePt" dir="t"/>
-    </dgm:scene3d>
-    <dgm:sp3d/>
-    <dgm:txPr/>
-    <dgm:style>
-      <a:lnRef idx="2">
-        <a:scrgbClr r="0" g="0" b="0"/>
-      </a:lnRef>
-      <a:fillRef idx="1">
-        <a:scrgbClr r="0" g="0" b="0"/>
-      </a:fillRef>
-      <a:effectRef idx="0">
-        <a:scrgbClr r="0" g="0" b="0"/>
-      </a:effectRef>
-      <a:fontRef idx="minor"/>
-    </dgm:style>
-  </dgm:styleLbl>
-  <dgm:styleLbl name="alignImgPlace1">
-    <dgm:scene3d>
-      <a:camera prst="orthographicFront"/>
-      <a:lightRig rig="threePt" dir="t"/>
-    </dgm:scene3d>
-    <dgm:sp3d/>
-    <dgm:txPr/>
-    <dgm:style>
-      <a:lnRef idx="2">
-        <a:scrgbClr r="0" g="0" b="0"/>
-      </a:lnRef>
-      <a:fillRef idx="1">
-        <a:scrgbClr r="0" g="0" b="0"/>
-      </a:fillRef>
-      <a:effectRef idx="0">
-        <a:scrgbClr r="0" g="0" b="0"/>
-      </a:effectRef>
-      <a:fontRef idx="minor"/>
-    </dgm:style>
-  </dgm:styleLbl>
-  <dgm:styleLbl name="bgImgPlace1">
-    <dgm:scene3d>
-      <a:camera prst="orthographicFront"/>
-      <a:lightRig rig="threePt" dir="t"/>
-    </dgm:scene3d>
-    <dgm:sp3d/>
-    <dgm:txPr/>
-    <dgm:style>
-      <a:lnRef idx="2">
-        <a:scrgbClr r="0" g="0" b="0"/>
-      </a:lnRef>
-      <a:fillRef idx="1">
-        <a:scrgbClr r="0" g="0" b="0"/>
-      </a:fillRef>
-      <a:effectRef idx="0">
-        <a:scrgbClr r="0" g="0" b="0"/>
-      </a:effectRef>
-      <a:fontRef idx="minor"/>
-    </dgm:style>
-  </dgm:styleLbl>
-  <dgm:styleLbl name="sibTrans2D1">
-    <dgm:scene3d>
-      <a:camera prst="orthographicFront"/>
-      <a:lightRig rig="threePt" dir="t"/>
-    </dgm:scene3d>
-    <dgm:sp3d/>
-    <dgm:txPr/>
-    <dgm:style>
-      <a:lnRef idx="0">
-        <a:scrgbClr r="0" g="0" b="0"/>
-      </a:lnRef>
-      <a:fillRef idx="1">
-        <a:scrgbClr r="0" g="0" b="0"/>
-      </a:fillRef>
-      <a:effectRef idx="0">
-        <a:scrgbClr r="0" g="0" b="0"/>
-      </a:effectRef>
-      <a:fontRef idx="minor">
-        <a:schemeClr val="lt1"/>
-      </a:fontRef>
-    </dgm:style>
-  </dgm:styleLbl>
-  <dgm:styleLbl name="fgSibTrans2D1">
-    <dgm:scene3d>
-      <a:camera prst="orthographicFront"/>
-      <a:lightRig rig="threePt" dir="t"/>
-    </dgm:scene3d>
-    <dgm:sp3d/>
-    <dgm:txPr/>
-    <dgm:style>
-      <a:lnRef idx="0">
-        <a:scrgbClr r="0" g="0" b="0"/>
-      </a:lnRef>
-      <a:fillRef idx="1">
-        <a:scrgbClr r="0" g="0" b="0"/>
-      </a:fillRef>
-      <a:effectRef idx="0">
-        <a:scrgbClr r="0" g="0" b="0"/>
-      </a:effectRef>
-      <a:fontRef idx="minor">
-        <a:schemeClr val="lt1"/>
-      </a:fontRef>
-    </dgm:style>
-  </dgm:styleLbl>
-  <dgm:styleLbl name="bgSibTrans2D1">
-    <dgm:scene3d>
-      <a:camera prst="orthographicFront"/>
-      <a:lightRig rig="threePt" dir="t"/>
-    </dgm:scene3d>
-    <dgm:sp3d/>
-    <dgm:txPr/>
-    <dgm:style>
-      <a:lnRef idx="0">
-        <a:scrgbClr r="0" g="0" b="0"/>
-      </a:lnRef>
-      <a:fillRef idx="1">
-        <a:scrgbClr r="0" g="0" b="0"/>
-      </a:fillRef>
-      <a:effectRef idx="0">
-        <a:scrgbClr r="0" g="0" b="0"/>
-      </a:effectRef>
-      <a:fontRef idx="minor">
-        <a:schemeClr val="lt1"/>
-      </a:fontRef>
-    </dgm:style>
-  </dgm:styleLbl>
-  <dgm:styleLbl name="sibTrans1D1">
-    <dgm:scene3d>
-      <a:camera prst="orthographicFront"/>
-      <a:lightRig rig="threePt" dir="t"/>
-    </dgm:scene3d>
-    <dgm:sp3d/>
-    <dgm:txPr/>
-    <dgm:style>
-      <a:lnRef idx="1">
-        <a:scrgbClr r="0" g="0" b="0"/>
-      </a:lnRef>
-      <a:fillRef idx="0">
-        <a:scrgbClr r="0" g="0" b="0"/>
-      </a:fillRef>
-      <a:effectRef idx="0">
-        <a:scrgbClr r="0" g="0" b="0"/>
-      </a:effectRef>
-      <a:fontRef idx="minor"/>
-    </dgm:style>
-  </dgm:styleLbl>
-  <dgm:styleLbl name="callout">
-    <dgm:scene3d>
-      <a:camera prst="orthographicFront"/>
-      <a:lightRig rig="threePt" dir="t"/>
-    </dgm:scene3d>
-    <dgm:sp3d/>
-    <dgm:txPr/>
-    <dgm:style>
-      <a:lnRef idx="2">
-        <a:scrgbClr r="0" g="0" b="0"/>
-      </a:lnRef>
-      <a:fillRef idx="1">
-        <a:scrgbClr r="0" g="0" b="0"/>
-      </a:fillRef>
-      <a:effectRef idx="0">
-        <a:scrgbClr r="0" g="0" b="0"/>
-      </a:effectRef>
-      <a:fontRef idx="minor"/>
-    </dgm:style>
-  </dgm:styleLbl>
-  <dgm:styleLbl name="asst0">
-    <dgm:scene3d>
-      <a:camera prst="orthographicFront"/>
-      <a:lightRig rig="threePt" dir="t"/>
-    </dgm:scene3d>
-    <dgm:sp3d/>
-    <dgm:txPr/>
-    <dgm:style>
-      <a:lnRef idx="2">
-        <a:scrgbClr r="0" g="0" b="0"/>
-      </a:lnRef>
-      <a:fillRef idx="1">
-        <a:scrgbClr r="0" g="0" b="0"/>
-      </a:fillRef>
-      <a:effectRef idx="0">
-        <a:scrgbClr r="0" g="0" b="0"/>
-      </a:effectRef>
-      <a:fontRef idx="minor">
-        <a:schemeClr val="lt1"/>
-      </a:fontRef>
-    </dgm:style>
-  </dgm:styleLbl>
-  <dgm:styleLbl name="asst1">
-    <dgm:scene3d>
-      <a:camera prst="orthographicFront"/>
-      <a:lightRig rig="threePt" dir="t"/>
-    </dgm:scene3d>
-    <dgm:sp3d/>
-    <dgm:txPr/>
-    <dgm:style>
-      <a:lnRef idx="2">
-        <a:scrgbClr r="0" g="0" b="0"/>
-      </a:lnRef>
-      <a:fillRef idx="1">
-        <a:scrgbClr r="0" g="0" b="0"/>
-      </a:fillRef>
-      <a:effectRef idx="0">
-        <a:scrgbClr r="0" g="0" b="0"/>
-      </a:effectRef>
-      <a:fontRef idx="minor">
-        <a:schemeClr val="lt1"/>
-      </a:fontRef>
-    </dgm:style>
-  </dgm:styleLbl>
-  <dgm:styleLbl name="asst2">
-    <dgm:scene3d>
-      <a:camera prst="orthographicFront"/>
-      <a:lightRig rig="threePt" dir="t"/>
-    </dgm:scene3d>
-    <dgm:sp3d/>
-    <dgm:txPr/>
-    <dgm:style>
-      <a:lnRef idx="2">
-        <a:scrgbClr r="0" g="0" b="0"/>
-      </a:lnRef>
-      <a:fillRef idx="1">
-        <a:scrgbClr r="0" g="0" b="0"/>
-      </a:fillRef>
-      <a:effectRef idx="0">
-        <a:scrgbClr r="0" g="0" b="0"/>
-      </a:effectRef>
-      <a:fontRef idx="minor">
-        <a:schemeClr val="lt1"/>
-      </a:fontRef>
-    </dgm:style>
-  </dgm:styleLbl>
-  <dgm:styleLbl name="asst3">
-    <dgm:scene3d>
-      <a:camera prst="orthographicFront"/>
-      <a:lightRig rig="threePt" dir="t"/>
-    </dgm:scene3d>
-    <dgm:sp3d/>
-    <dgm:txPr/>
-    <dgm:style>
-      <a:lnRef idx="2">
-        <a:scrgbClr r="0" g="0" b="0"/>
-      </a:lnRef>
-      <a:fillRef idx="1">
-        <a:scrgbClr r="0" g="0" b="0"/>
-      </a:fillRef>
-      <a:effectRef idx="0">
-        <a:scrgbClr r="0" g="0" b="0"/>
-      </a:effectRef>
-      <a:fontRef idx="minor">
-        <a:schemeClr val="lt1"/>
-      </a:fontRef>
-    </dgm:style>
-  </dgm:styleLbl>
-  <dgm:styleLbl name="asst4">
-    <dgm:scene3d>
-      <a:camera prst="orthographicFront"/>
-      <a:lightRig rig="threePt" dir="t"/>
-    </dgm:scene3d>
-    <dgm:sp3d/>
-    <dgm:txPr/>
-    <dgm:style>
-      <a:lnRef idx="2">
-        <a:scrgbClr r="0" g="0" b="0"/>
-      </a:lnRef>
-      <a:fillRef idx="1">
-        <a:scrgbClr r="0" g="0" b="0"/>
-      </a:fillRef>
-      <a:effectRef idx="0">
-        <a:scrgbClr r="0" g="0" b="0"/>
-      </a:effectRef>
-      <a:fontRef idx="minor">
-        <a:schemeClr val="lt1"/>
-      </a:fontRef>
-    </dgm:style>
-  </dgm:styleLbl>
-  <dgm:styleLbl name="parChTrans2D1">
-    <dgm:scene3d>
-      <a:camera prst="orthographicFront"/>
-      <a:lightRig rig="threePt" dir="t"/>
-    </dgm:scene3d>
-    <dgm:sp3d/>
-    <dgm:txPr/>
-    <dgm:style>
-      <a:lnRef idx="2">
-        <a:scrgbClr r="0" g="0" b="0"/>
-      </a:lnRef>
-      <a:fillRef idx="1">
-        <a:scrgbClr r="0" g="0" b="0"/>
-      </a:fillRef>
-      <a:effectRef idx="0">
-        <a:scrgbClr r="0" g="0" b="0"/>
-      </a:effectRef>
-      <a:fontRef idx="minor">
-        <a:schemeClr val="lt1"/>
-      </a:fontRef>
-    </dgm:style>
-  </dgm:styleLbl>
-  <dgm:styleLbl name="parChTrans2D2">
-    <dgm:scene3d>
-      <a:camera prst="orthographicFront"/>
-      <a:lightRig rig="threePt" dir="t"/>
-    </dgm:scene3d>
-    <dgm:sp3d/>
-    <dgm:txPr/>
-    <dgm:style>
-      <a:lnRef idx="2">
-        <a:scrgbClr r="0" g="0" b="0"/>
-      </a:lnRef>
-      <a:fillRef idx="1">
-        <a:scrgbClr r="0" g="0" b="0"/>
-      </a:fillRef>
-      <a:effectRef idx="0">
-        <a:scrgbClr r="0" g="0" b="0"/>
-      </a:effectRef>
-      <a:fontRef idx="minor">
-        <a:schemeClr val="lt1"/>
-      </a:fontRef>
-    </dgm:style>
-  </dgm:styleLbl>
-  <dgm:styleLbl name="parChTrans2D3">
-    <dgm:scene3d>
-      <a:camera prst="orthographicFront"/>
-      <a:lightRig rig="threePt" dir="t"/>
-    </dgm:scene3d>
-    <dgm:sp3d/>
-    <dgm:txPr/>
-    <dgm:style>
-      <a:lnRef idx="2">
-        <a:scrgbClr r="0" g="0" b="0"/>
-      </a:lnRef>
-      <a:fillRef idx="1">
-        <a:scrgbClr r="0" g="0" b="0"/>
-      </a:fillRef>
-      <a:effectRef idx="0">
-        <a:scrgbClr r="0" g="0" b="0"/>
-      </a:effectRef>
-      <a:fontRef idx="minor">
-        <a:schemeClr val="lt1"/>
-      </a:fontRef>
-    </dgm:style>
-  </dgm:styleLbl>
-  <dgm:styleLbl name="parChTrans2D4">
-    <dgm:scene3d>
-      <a:camera prst="orthographicFront"/>
-      <a:lightRig rig="threePt" dir="t"/>
-    </dgm:scene3d>
-    <dgm:sp3d/>
-    <dgm:txPr/>
-    <dgm:style>
-      <a:lnRef idx="2">
-        <a:scrgbClr r="0" g="0" b="0"/>
-      </a:lnRef>
-      <a:fillRef idx="1">
-        <a:scrgbClr r="0" g="0" b="0"/>
-      </a:fillRef>
-      <a:effectRef idx="0">
-        <a:scrgbClr r="0" g="0" b="0"/>
-      </a:effectRef>
-      <a:fontRef idx="minor">
-        <a:schemeClr val="lt1"/>
-      </a:fontRef>
-    </dgm:style>
-  </dgm:styleLbl>
-  <dgm:styleLbl name="parChTrans1D1">
-    <dgm:scene3d>
-      <a:camera prst="orthographicFront"/>
-      <a:lightRig rig="threePt" dir="t"/>
-    </dgm:scene3d>
-    <dgm:sp3d/>
-    <dgm:txPr/>
-    <dgm:style>
-      <a:lnRef idx="2">
-        <a:scrgbClr r="0" g="0" b="0"/>
-      </a:lnRef>
-      <a:fillRef idx="0">
-        <a:scrgbClr r="0" g="0" b="0"/>
-      </a:fillRef>
-      <a:effectRef idx="0">
-        <a:scrgbClr r="0" g="0" b="0"/>
-      </a:effectRef>
-      <a:fontRef idx="minor"/>
-    </dgm:style>
-  </dgm:styleLbl>
-  <dgm:styleLbl name="parChTrans1D2">
-    <dgm:scene3d>
-      <a:camera prst="orthographicFront"/>
-      <a:lightRig rig="threePt" dir="t"/>
-    </dgm:scene3d>
-    <dgm:sp3d/>
-    <dgm:txPr/>
-    <dgm:style>
-      <a:lnRef idx="2">
-        <a:scrgbClr r="0" g="0" b="0"/>
-      </a:lnRef>
-      <a:fillRef idx="0">
-        <a:scrgbClr r="0" g="0" b="0"/>
-      </a:fillRef>
-      <a:effectRef idx="0">
-        <a:scrgbClr r="0" g="0" b="0"/>
-      </a:effectRef>
-      <a:fontRef idx="minor"/>
-    </dgm:style>
-  </dgm:styleLbl>
-  <dgm:styleLbl name="parChTrans1D3">
-    <dgm:scene3d>
-      <a:camera prst="orthographicFront"/>
-      <a:lightRig rig="threePt" dir="t"/>
-    </dgm:scene3d>
-    <dgm:sp3d/>
-    <dgm:txPr/>
-    <dgm:style>
-      <a:lnRef idx="2">
-        <a:scrgbClr r="0" g="0" b="0"/>
-      </a:lnRef>
-      <a:fillRef idx="0">
-        <a:scrgbClr r="0" g="0" b="0"/>
-      </a:fillRef>
-      <a:effectRef idx="0">
-        <a:scrgbClr r="0" g="0" b="0"/>
-      </a:effectRef>
-      <a:fontRef idx="minor"/>
-    </dgm:style>
-  </dgm:styleLbl>
-  <dgm:styleLbl name="parChTrans1D4">
-    <dgm:scene3d>
-      <a:camera prst="orthographicFront"/>
-      <a:lightRig rig="threePt" dir="t"/>
-    </dgm:scene3d>
-    <dgm:sp3d/>
-    <dgm:txPr/>
-    <dgm:style>
-      <a:lnRef idx="2">
-        <a:scrgbClr r="0" g="0" b="0"/>
-      </a:lnRef>
-      <a:fillRef idx="0">
-        <a:scrgbClr r="0" g="0" b="0"/>
-      </a:fillRef>
-      <a:effectRef idx="0">
-        <a:scrgbClr r="0" g="0" b="0"/>
-      </a:effectRef>
-      <a:fontRef idx="minor"/>
-    </dgm:style>
-  </dgm:styleLbl>
-  <dgm:styleLbl name="fgAcc1">
-    <dgm:scene3d>
-      <a:camera prst="orthographicFront"/>
-      <a:lightRig rig="threePt" dir="t"/>
-    </dgm:scene3d>
-    <dgm:sp3d/>
-    <dgm:txPr/>
-    <dgm:style>
-      <a:lnRef idx="2">
-        <a:scrgbClr r="0" g="0" b="0"/>
-      </a:lnRef>
-      <a:fillRef idx="1">
-        <a:scrgbClr r="0" g="0" b="0"/>
-      </a:fillRef>
-      <a:effectRef idx="0">
-        <a:scrgbClr r="0" g="0" b="0"/>
-      </a:effectRef>
-      <a:fontRef idx="minor"/>
-    </dgm:style>
-  </dgm:styleLbl>
-  <dgm:styleLbl name="conFgAcc1">
-    <dgm:scene3d>
-      <a:camera prst="orthographicFront"/>
-      <a:lightRig rig="threePt" dir="t"/>
-    </dgm:scene3d>
-    <dgm:sp3d/>
-    <dgm:txPr/>
-    <dgm:style>
-      <a:lnRef idx="2">
-        <a:scrgbClr r="0" g="0" b="0"/>
-      </a:lnRef>
-      <a:fillRef idx="1">
-        <a:scrgbClr r="0" g="0" b="0"/>
-      </a:fillRef>
-      <a:effectRef idx="0">
-        <a:scrgbClr r="0" g="0" b="0"/>
-      </a:effectRef>
-      <a:fontRef idx="minor"/>
-    </dgm:style>
-  </dgm:styleLbl>
-  <dgm:styleLbl name="alignAcc1">
-    <dgm:scene3d>
-      <a:camera prst="orthographicFront"/>
-      <a:lightRig rig="threePt" dir="t"/>
-    </dgm:scene3d>
-    <dgm:sp3d/>
-    <dgm:txPr/>
-    <dgm:style>
-      <a:lnRef idx="2">
-        <a:scrgbClr r="0" g="0" b="0"/>
-      </a:lnRef>
-      <a:fillRef idx="1">
-        <a:scrgbClr r="0" g="0" b="0"/>
-      </a:fillRef>
-      <a:effectRef idx="0">
-        <a:scrgbClr r="0" g="0" b="0"/>
-      </a:effectRef>
-      <a:fontRef idx="minor"/>
-    </dgm:style>
-  </dgm:styleLbl>
-  <dgm:styleLbl name="trAlignAcc1">
-    <dgm:scene3d>
-      <a:camera prst="orthographicFront"/>
-      <a:lightRig rig="threePt" dir="t"/>
-    </dgm:scene3d>
-    <dgm:sp3d/>
-    <dgm:txPr/>
-    <dgm:style>
-      <a:lnRef idx="1">
-        <a:scrgbClr r="0" g="0" b="0"/>
-      </a:lnRef>
-      <a:fillRef idx="1">
-        <a:scrgbClr r="0" g="0" b="0"/>
-      </a:fillRef>
-      <a:effectRef idx="0">
-        <a:scrgbClr r="0" g="0" b="0"/>
-      </a:effectRef>
-      <a:fontRef idx="minor"/>
-    </dgm:style>
-  </dgm:styleLbl>
-  <dgm:styleLbl name="bgAcc1">
-    <dgm:scene3d>
-      <a:camera prst="orthographicFront"/>
-      <a:lightRig rig="threePt" dir="t"/>
-    </dgm:scene3d>
-    <dgm:sp3d/>
-    <dgm:txPr/>
-    <dgm:style>
-      <a:lnRef idx="2">
-        <a:scrgbClr r="0" g="0" b="0"/>
-      </a:lnRef>
-      <a:fillRef idx="1">
-        <a:scrgbClr r="0" g="0" b="0"/>
-      </a:fillRef>
-      <a:effectRef idx="0">
-        <a:scrgbClr r="0" g="0" b="0"/>
-      </a:effectRef>
-      <a:fontRef idx="minor"/>
-    </dgm:style>
-  </dgm:styleLbl>
-  <dgm:styleLbl name="solidFgAcc1">
-    <dgm:scene3d>
-      <a:camera prst="orthographicFront"/>
-      <a:lightRig rig="threePt" dir="t"/>
-    </dgm:scene3d>
-    <dgm:sp3d/>
-    <dgm:txPr/>
-    <dgm:style>
-      <a:lnRef idx="2">
-        <a:scrgbClr r="0" g="0" b="0"/>
-      </a:lnRef>
-      <a:fillRef idx="1">
-        <a:scrgbClr r="0" g="0" b="0"/>
-      </a:fillRef>
-      <a:effectRef idx="0">
-        <a:scrgbClr r="0" g="0" b="0"/>
-      </a:effectRef>
-      <a:fontRef idx="minor"/>
-    </dgm:style>
-  </dgm:styleLbl>
-  <dgm:styleLbl name="solidAlignAcc1">
-    <dgm:scene3d>
-      <a:camera prst="orthographicFront"/>
-      <a:lightRig rig="threePt" dir="t"/>
-    </dgm:scene3d>
-    <dgm:sp3d/>
-    <dgm:txPr/>
-    <dgm:style>
-      <a:lnRef idx="2">
-        <a:scrgbClr r="0" g="0" b="0"/>
-      </a:lnRef>
-      <a:fillRef idx="1">
-        <a:scrgbClr r="0" g="0" b="0"/>
-      </a:fillRef>
-      <a:effectRef idx="0">
-        <a:scrgbClr r="0" g="0" b="0"/>
-      </a:effectRef>
-      <a:fontRef idx="minor"/>
-    </dgm:style>
-  </dgm:styleLbl>
-  <dgm:styleLbl name="solidBgAcc1">
-    <dgm:scene3d>
-      <a:camera prst="orthographicFront"/>
-      <a:lightRig rig="threePt" dir="t"/>
-    </dgm:scene3d>
-    <dgm:sp3d/>
-    <dgm:txPr/>
-    <dgm:style>
-      <a:lnRef idx="2">
-        <a:scrgbClr r="0" g="0" b="0"/>
-      </a:lnRef>
-      <a:fillRef idx="1">
-        <a:scrgbClr r="0" g="0" b="0"/>
-      </a:fillRef>
-      <a:effectRef idx="0">
-        <a:scrgbClr r="0" g="0" b="0"/>
-      </a:effectRef>
-      <a:fontRef idx="minor"/>
-    </dgm:style>
-  </dgm:styleLbl>
-  <dgm:styleLbl name="fgAccFollowNode1">
-    <dgm:scene3d>
-      <a:camera prst="orthographicFront"/>
-      <a:lightRig rig="threePt" dir="t"/>
-    </dgm:scene3d>
-    <dgm:sp3d/>
-    <dgm:txPr/>
-    <dgm:style>
-      <a:lnRef idx="2">
-        <a:scrgbClr r="0" g="0" b="0"/>
-      </a:lnRef>
-      <a:fillRef idx="1">
-        <a:scrgbClr r="0" g="0" b="0"/>
-      </a:fillRef>
-      <a:effectRef idx="0">
-        <a:scrgbClr r="0" g="0" b="0"/>
-      </a:effectRef>
-      <a:fontRef idx="minor"/>
-    </dgm:style>
-  </dgm:styleLbl>
-  <dgm:styleLbl name="alignAccFollowNode1">
-    <dgm:scene3d>
-      <a:camera prst="orthographicFront"/>
-      <a:lightRig rig="threePt" dir="t"/>
-    </dgm:scene3d>
-    <dgm:sp3d/>
-    <dgm:txPr/>
-    <dgm:style>
-      <a:lnRef idx="2">
-        <a:scrgbClr r="0" g="0" b="0"/>
-      </a:lnRef>
-      <a:fillRef idx="1">
-        <a:scrgbClr r="0" g="0" b="0"/>
-      </a:fillRef>
-      <a:effectRef idx="0">
-        <a:scrgbClr r="0" g="0" b="0"/>
-      </a:effectRef>
-      <a:fontRef idx="minor"/>
-    </dgm:style>
-  </dgm:styleLbl>
-  <dgm:styleLbl name="bgAccFollowNode1">
-    <dgm:scene3d>
-      <a:camera prst="orthographicFront"/>
-      <a:lightRig rig="threePt" dir="t"/>
-    </dgm:scene3d>
-    <dgm:sp3d/>
-    <dgm:txPr/>
-    <dgm:style>
-      <a:lnRef idx="2">
-        <a:scrgbClr r="0" g="0" b="0"/>
-      </a:lnRef>
-      <a:fillRef idx="1">
-        <a:scrgbClr r="0" g="0" b="0"/>
-      </a:fillRef>
-      <a:effectRef idx="0">
-        <a:scrgbClr r="0" g="0" b="0"/>
-      </a:effectRef>
-      <a:fontRef idx="minor"/>
-    </dgm:style>
-  </dgm:styleLbl>
-  <dgm:styleLbl name="fgAcc0">
-    <dgm:scene3d>
-      <a:camera prst="orthographicFront"/>
-      <a:lightRig rig="threePt" dir="t"/>
-    </dgm:scene3d>
-    <dgm:sp3d/>
-    <dgm:txPr/>
-    <dgm:style>
-      <a:lnRef idx="2">
-        <a:scrgbClr r="0" g="0" b="0"/>
-      </a:lnRef>
-      <a:fillRef idx="1">
-        <a:scrgbClr r="0" g="0" b="0"/>
-      </a:fillRef>
-      <a:effectRef idx="0">
-        <a:scrgbClr r="0" g="0" b="0"/>
-      </a:effectRef>
-      <a:fontRef idx="minor"/>
-    </dgm:style>
-  </dgm:styleLbl>
-  <dgm:styleLbl name="fgAcc2">
-    <dgm:scene3d>
-      <a:camera prst="orthographicFront"/>
-      <a:lightRig rig="threePt" dir="t"/>
-    </dgm:scene3d>
-    <dgm:sp3d/>
-    <dgm:txPr/>
-    <dgm:style>
-      <a:lnRef idx="2">
-        <a:scrgbClr r="0" g="0" b="0"/>
-      </a:lnRef>
-      <a:fillRef idx="1">
-        <a:scrgbClr r="0" g="0" b="0"/>
-      </a:fillRef>
-      <a:effectRef idx="0">
-        <a:scrgbClr r="0" g="0" b="0"/>
-      </a:effectRef>
-      <a:fontRef idx="minor"/>
-    </dgm:style>
-  </dgm:styleLbl>
-  <dgm:styleLbl name="fgAcc3">
-    <dgm:scene3d>
-      <a:camera prst="orthographicFront"/>
-      <a:lightRig rig="threePt" dir="t"/>
-    </dgm:scene3d>
-    <dgm:sp3d/>
-    <dgm:txPr/>
-    <dgm:style>
-      <a:lnRef idx="2">
-        <a:scrgbClr r="0" g="0" b="0"/>
-      </a:lnRef>
-      <a:fillRef idx="1">
-        <a:scrgbClr r="0" g="0" b="0"/>
-      </a:fillRef>
-      <a:effectRef idx="0">
-        <a:scrgbClr r="0" g="0" b="0"/>
-      </a:effectRef>
-      <a:fontRef idx="minor"/>
-    </dgm:style>
-  </dgm:styleLbl>
-  <dgm:styleLbl name="fgAcc4">
-    <dgm:scene3d>
-      <a:camera prst="orthographicFront"/>
-      <a:lightRig rig="threePt" dir="t"/>
-    </dgm:scene3d>
-    <dgm:sp3d/>
-    <dgm:txPr/>
-    <dgm:style>
-      <a:lnRef idx="2">
-        <a:scrgbClr r="0" g="0" b="0"/>
-      </a:lnRef>
-      <a:fillRef idx="1">
-        <a:scrgbClr r="0" g="0" b="0"/>
-      </a:fillRef>
-      <a:effectRef idx="0">
-        <a:scrgbClr r="0" g="0" b="0"/>
-      </a:effectRef>
-      <a:fontRef idx="minor"/>
-    </dgm:style>
-  </dgm:styleLbl>
-  <dgm:styleLbl name="bgShp">
-    <dgm:scene3d>
-      <a:camera prst="orthographicFront"/>
-      <a:lightRig rig="threePt" dir="t"/>
-    </dgm:scene3d>
-    <dgm:sp3d/>
-    <dgm:txPr/>
-    <dgm:style>
-      <a:lnRef idx="0">
-        <a:scrgbClr r="0" g="0" b="0"/>
-      </a:lnRef>
-      <a:fillRef idx="1">
-        <a:scrgbClr r="0" g="0" b="0"/>
-      </a:fillRef>
-      <a:effectRef idx="0">
-        <a:scrgbClr r="0" g="0" b="0"/>
-      </a:effectRef>
-      <a:fontRef idx="minor"/>
-    </dgm:style>
-  </dgm:styleLbl>
-  <dgm:styleLbl name="dkBgShp">
-    <dgm:scene3d>
-      <a:camera prst="orthographicFront"/>
-      <a:lightRig rig="threePt" dir="t"/>
-    </dgm:scene3d>
-    <dgm:sp3d/>
-    <dgm:txPr/>
-    <dgm:style>
-      <a:lnRef idx="0">
-        <a:scrgbClr r="0" g="0" b="0"/>
-      </a:lnRef>
-      <a:fillRef idx="1">
-        <a:scrgbClr r="0" g="0" b="0"/>
-      </a:fillRef>
-      <a:effectRef idx="0">
-        <a:scrgbClr r="0" g="0" b="0"/>
-      </a:effectRef>
-      <a:fontRef idx="minor"/>
-    </dgm:style>
-  </dgm:styleLbl>
-  <dgm:styleLbl name="trBgShp">
-    <dgm:scene3d>
-      <a:camera prst="orthographicFront"/>
-      <a:lightRig rig="threePt" dir="t"/>
-    </dgm:scene3d>
-    <dgm:sp3d/>
-    <dgm:txPr/>
-    <dgm:style>
-      <a:lnRef idx="0">
-        <a:scrgbClr r="0" g="0" b="0"/>
-      </a:lnRef>
-      <a:fillRef idx="1">
-        <a:scrgbClr r="0" g="0" b="0"/>
-      </a:fillRef>
-      <a:effectRef idx="0">
-        <a:scrgbClr r="0" g="0" b="0"/>
-      </a:effectRef>
-      <a:fontRef idx="minor"/>
-    </dgm:style>
-  </dgm:styleLbl>
-  <dgm:styleLbl name="fgShp">
-    <dgm:scene3d>
-      <a:camera prst="orthographicFront"/>
-      <a:lightRig rig="threePt" dir="t"/>
-    </dgm:scene3d>
-    <dgm:sp3d/>
-    <dgm:txPr/>
-    <dgm:style>
-      <a:lnRef idx="2">
-        <a:scrgbClr r="0" g="0" b="0"/>
-      </a:lnRef>
-      <a:fillRef idx="1">
-        <a:scrgbClr r="0" g="0" b="0"/>
-      </a:fillRef>
-      <a:effectRef idx="0">
-        <a:scrgbClr r="0" g="0" b="0"/>
-      </a:effectRef>
-      <a:fontRef idx="minor"/>
-    </dgm:style>
-  </dgm:styleLbl>
-  <dgm:styleLbl name="revTx">
-    <dgm:scene3d>
-      <a:camera prst="orthographicFront"/>
-      <a:lightRig rig="threePt" dir="t"/>
-    </dgm:scene3d>
-    <dgm:sp3d/>
-    <dgm:txPr/>
-    <dgm:style>
-      <a:lnRef idx="0">
-        <a:scrgbClr r="0" g="0" b="0"/>
-      </a:lnRef>
-      <a:fillRef idx="0">
-        <a:scrgbClr r="0" g="0" b="0"/>
-      </a:fillRef>
-      <a:effectRef idx="0">
-        <a:scrgbClr r="0" g="0" b="0"/>
-      </a:effectRef>
-      <a:fontRef idx="minor"/>
-    </dgm:style>
-  </dgm:styleLbl>
-</dgm:styleDef>
 </file>
 
 <file path=ppt/slideLayouts/slideLayout1.xml><?xml version="1.0" encoding="utf-8"?>
@@ -3789,7 +359,7 @@
           <a:p>
             <a:fld id="{3CA7994E-0C3A-4FC8-B089-E55DA23F32FF}" type="datetimeFigureOut">
               <a:rPr lang="es-ES" smtClean="0"/>
-              <a:t>02/11/2023</a:t>
+              <a:t>06/11/2023</a:t>
             </a:fld>
             <a:endParaRPr lang="es-ES"/>
           </a:p>
@@ -3987,7 +557,7 @@
           <a:p>
             <a:fld id="{3CA7994E-0C3A-4FC8-B089-E55DA23F32FF}" type="datetimeFigureOut">
               <a:rPr lang="es-ES" smtClean="0"/>
-              <a:t>02/11/2023</a:t>
+              <a:t>06/11/2023</a:t>
             </a:fld>
             <a:endParaRPr lang="es-ES"/>
           </a:p>
@@ -4195,7 +765,7 @@
           <a:p>
             <a:fld id="{3CA7994E-0C3A-4FC8-B089-E55DA23F32FF}" type="datetimeFigureOut">
               <a:rPr lang="es-ES" smtClean="0"/>
-              <a:t>02/11/2023</a:t>
+              <a:t>06/11/2023</a:t>
             </a:fld>
             <a:endParaRPr lang="es-ES"/>
           </a:p>
@@ -4393,7 +963,7 @@
           <a:p>
             <a:fld id="{3CA7994E-0C3A-4FC8-B089-E55DA23F32FF}" type="datetimeFigureOut">
               <a:rPr lang="es-ES" smtClean="0"/>
-              <a:t>02/11/2023</a:t>
+              <a:t>06/11/2023</a:t>
             </a:fld>
             <a:endParaRPr lang="es-ES"/>
           </a:p>
@@ -4668,7 +1238,7 @@
           <a:p>
             <a:fld id="{3CA7994E-0C3A-4FC8-B089-E55DA23F32FF}" type="datetimeFigureOut">
               <a:rPr lang="es-ES" smtClean="0"/>
-              <a:t>02/11/2023</a:t>
+              <a:t>06/11/2023</a:t>
             </a:fld>
             <a:endParaRPr lang="es-ES"/>
           </a:p>
@@ -4933,7 +1503,7 @@
           <a:p>
             <a:fld id="{3CA7994E-0C3A-4FC8-B089-E55DA23F32FF}" type="datetimeFigureOut">
               <a:rPr lang="es-ES" smtClean="0"/>
-              <a:t>02/11/2023</a:t>
+              <a:t>06/11/2023</a:t>
             </a:fld>
             <a:endParaRPr lang="es-ES"/>
           </a:p>
@@ -5345,7 +1915,7 @@
           <a:p>
             <a:fld id="{3CA7994E-0C3A-4FC8-B089-E55DA23F32FF}" type="datetimeFigureOut">
               <a:rPr lang="es-ES" smtClean="0"/>
-              <a:t>02/11/2023</a:t>
+              <a:t>06/11/2023</a:t>
             </a:fld>
             <a:endParaRPr lang="es-ES"/>
           </a:p>
@@ -5486,7 +2056,7 @@
           <a:p>
             <a:fld id="{3CA7994E-0C3A-4FC8-B089-E55DA23F32FF}" type="datetimeFigureOut">
               <a:rPr lang="es-ES" smtClean="0"/>
-              <a:t>02/11/2023</a:t>
+              <a:t>06/11/2023</a:t>
             </a:fld>
             <a:endParaRPr lang="es-ES"/>
           </a:p>
@@ -5599,7 +2169,7 @@
           <a:p>
             <a:fld id="{3CA7994E-0C3A-4FC8-B089-E55DA23F32FF}" type="datetimeFigureOut">
               <a:rPr lang="es-ES" smtClean="0"/>
-              <a:t>02/11/2023</a:t>
+              <a:t>06/11/2023</a:t>
             </a:fld>
             <a:endParaRPr lang="es-ES"/>
           </a:p>
@@ -5910,7 +2480,7 @@
           <a:p>
             <a:fld id="{3CA7994E-0C3A-4FC8-B089-E55DA23F32FF}" type="datetimeFigureOut">
               <a:rPr lang="es-ES" smtClean="0"/>
-              <a:t>02/11/2023</a:t>
+              <a:t>06/11/2023</a:t>
             </a:fld>
             <a:endParaRPr lang="es-ES"/>
           </a:p>
@@ -6198,7 +2768,7 @@
           <a:p>
             <a:fld id="{3CA7994E-0C3A-4FC8-B089-E55DA23F32FF}" type="datetimeFigureOut">
               <a:rPr lang="es-ES" smtClean="0"/>
-              <a:t>02/11/2023</a:t>
+              <a:t>06/11/2023</a:t>
             </a:fld>
             <a:endParaRPr lang="es-ES"/>
           </a:p>
@@ -6439,7 +3009,7 @@
           <a:p>
             <a:fld id="{3CA7994E-0C3A-4FC8-B089-E55DA23F32FF}" type="datetimeFigureOut">
               <a:rPr lang="es-ES" smtClean="0"/>
-              <a:t>02/11/2023</a:t>
+              <a:t>06/11/2023</a:t>
             </a:fld>
             <a:endParaRPr lang="es-ES"/>
           </a:p>
@@ -6856,64 +3426,6 @@
           <a:chExt cx="0" cy="0"/>
         </a:xfrm>
       </p:grpSpPr>
-      <p:graphicFrame>
-        <p:nvGraphicFramePr>
-          <p:cNvPr id="7" name="Diagrama 6">
-            <a:extLst>
-              <a:ext uri="{FF2B5EF4-FFF2-40B4-BE49-F238E27FC236}">
-                <a16:creationId xmlns:a16="http://schemas.microsoft.com/office/drawing/2014/main" id="{02098F92-234C-425C-82A4-CEA1DC0FCFCF}"/>
-              </a:ext>
-            </a:extLst>
-          </p:cNvPr>
-          <p:cNvGraphicFramePr/>
-          <p:nvPr>
-            <p:extLst>
-              <p:ext uri="{D42A27DB-BD31-4B8C-83A1-F6EECF244321}">
-                <p14:modId xmlns:p14="http://schemas.microsoft.com/office/powerpoint/2010/main" val="2713147451"/>
-              </p:ext>
-            </p:extLst>
-          </p:nvPr>
-        </p:nvGraphicFramePr>
-        <p:xfrm>
-          <a:off x="0" y="0"/>
-          <a:ext cx="12192000" cy="6858000"/>
-        </p:xfrm>
-        <a:graphic>
-          <a:graphicData uri="http://schemas.openxmlformats.org/drawingml/2006/diagram">
-            <dgm:relIds xmlns:dgm="http://schemas.openxmlformats.org/drawingml/2006/diagram" xmlns:r="http://schemas.openxmlformats.org/officeDocument/2006/relationships" r:dm="rId2" r:lo="rId3" r:qs="rId4" r:cs="rId5"/>
-          </a:graphicData>
-        </a:graphic>
-      </p:graphicFrame>
-    </p:spTree>
-    <p:extLst>
-      <p:ext uri="{BB962C8B-B14F-4D97-AF65-F5344CB8AC3E}">
-        <p14:creationId xmlns:p14="http://schemas.microsoft.com/office/powerpoint/2010/main" val="1471484158"/>
-      </p:ext>
-    </p:extLst>
-  </p:cSld>
-  <p:clrMapOvr>
-    <a:masterClrMapping/>
-  </p:clrMapOvr>
-</p:sld>
-</file>
-
-<file path=ppt/slides/slide2.xml><?xml version="1.0" encoding="utf-8"?>
-<p:sld xmlns:a="http://schemas.openxmlformats.org/drawingml/2006/main" xmlns:r="http://schemas.openxmlformats.org/officeDocument/2006/relationships" xmlns:p="http://schemas.openxmlformats.org/presentationml/2006/main">
-  <p:cSld>
-    <p:spTree>
-      <p:nvGrpSpPr>
-        <p:cNvPr id="1" name=""/>
-        <p:cNvGrpSpPr/>
-        <p:nvPr/>
-      </p:nvGrpSpPr>
-      <p:grpSpPr>
-        <a:xfrm>
-          <a:off x="0" y="0"/>
-          <a:ext cx="0" cy="0"/>
-          <a:chOff x="0" y="0"/>
-          <a:chExt cx="0" cy="0"/>
-        </a:xfrm>
-      </p:grpSpPr>
       <p:sp>
         <p:nvSpPr>
           <p:cNvPr id="3" name="Rectángulo: esquinas redondeadas 2">
@@ -6968,6 +3480,14 @@
           <a:p>
             <a:pPr algn="ctr"/>
             <a:r>
+              <a:rPr lang="es-ES" dirty="0">
+                <a:solidFill>
+                  <a:srgbClr val="002060"/>
+                </a:solidFill>
+              </a:rPr>
+              <a:t>2. </a:t>
+            </a:r>
+            <a:r>
               <a:rPr lang="es-ES" dirty="0" err="1">
                 <a:solidFill>
                   <a:srgbClr val="002060"/>
@@ -7066,6 +3586,10 @@
           <a:p>
             <a:pPr algn="ctr"/>
             <a:r>
+              <a:rPr lang="es-ES" dirty="0"/>
+              <a:t>3. </a:t>
+            </a:r>
+            <a:r>
               <a:rPr lang="es-ES" dirty="0" err="1"/>
               <a:t>Construction</a:t>
             </a:r>
@@ -7148,12 +3672,20 @@
           <a:p>
             <a:pPr algn="ctr"/>
             <a:r>
+              <a:rPr lang="es-ES" dirty="0"/>
+              <a:t>4. </a:t>
+            </a:r>
+            <a:r>
               <a:rPr lang="es-ES" dirty="0" err="1"/>
               <a:t>Spatial</a:t>
             </a:r>
+            <a:endParaRPr lang="es-ES" dirty="0"/>
+          </a:p>
+          <a:p>
+            <a:pPr algn="ctr"/>
             <a:r>
               <a:rPr lang="es-ES" dirty="0"/>
-              <a:t> Principal </a:t>
+              <a:t>Principal </a:t>
             </a:r>
             <a:r>
               <a:rPr lang="es-ES" dirty="0" err="1"/>
@@ -7225,6 +3757,10 @@
           <a:p>
             <a:pPr algn="ctr"/>
             <a:r>
+              <a:rPr lang="es-ES" dirty="0"/>
+              <a:t>5. </a:t>
+            </a:r>
+            <a:r>
               <a:rPr lang="es-ES" dirty="0" err="1"/>
               <a:t>Extraction</a:t>
             </a:r>
@@ -7368,6 +3904,14 @@
           <a:p>
             <a:pPr algn="ctr"/>
             <a:r>
+              <a:rPr lang="es-ES" dirty="0">
+                <a:solidFill>
+                  <a:srgbClr val="002060"/>
+                </a:solidFill>
+              </a:rPr>
+              <a:t>1. </a:t>
+            </a:r>
+            <a:r>
               <a:rPr lang="es-ES" dirty="0" err="1">
                 <a:solidFill>
                   <a:srgbClr val="002060"/>
@@ -7484,6 +4028,10 @@
           <a:lstStyle/>
           <a:p>
             <a:pPr algn="ctr"/>
+            <a:r>
+              <a:rPr lang="es-ES" dirty="0"/>
+              <a:t>6. </a:t>
+            </a:r>
             <a:r>
               <a:rPr lang="es-ES" dirty="0" err="1"/>
               <a:t>Scaling</a:t>
@@ -7801,6 +4349,23 @@
 </file>
 
 <file path=customXml/item1.xml><?xml version="1.0" encoding="utf-8"?>
+<p:properties xmlns:p="http://schemas.microsoft.com/office/2006/metadata/properties" xmlns:xsi="http://www.w3.org/2001/XMLSchema-instance" xmlns:pc="http://schemas.microsoft.com/office/infopath/2007/PartnerControls">
+  <documentManagement>
+    <_activity xmlns="9ee2b467-fd2b-49f2-9b43-5897238b7b59" xsi:nil="true"/>
+  </documentManagement>
+</p:properties>
+</file>
+
+<file path=customXml/item2.xml><?xml version="1.0" encoding="utf-8"?>
+<?mso-contentType ?>
+<FormTemplates xmlns="http://schemas.microsoft.com/sharepoint/v3/contenttype/forms">
+  <Display>DocumentLibraryForm</Display>
+  <Edit>DocumentLibraryForm</Edit>
+  <New>DocumentLibraryForm</New>
+</FormTemplates>
+</file>
+
+<file path=customXml/item3.xml><?xml version="1.0" encoding="utf-8"?>
 <ct:contentTypeSchema xmlns:ct="http://schemas.microsoft.com/office/2006/metadata/contentType" xmlns:ma="http://schemas.microsoft.com/office/2006/metadata/properties/metaAttributes" ct:_="" ma:_="" ma:contentTypeName="Documento" ma:contentTypeID="0x010100A141915AF7954446ACA0D199B4A6F95F" ma:contentTypeVersion="11" ma:contentTypeDescription="Crear nuevo documento." ma:contentTypeScope="" ma:versionID="58210b020deefc3d5f70a5ef8f57ab84">
   <xsd:schema xmlns:xsd="http://www.w3.org/2001/XMLSchema" xmlns:xs="http://www.w3.org/2001/XMLSchema" xmlns:p="http://schemas.microsoft.com/office/2006/metadata/properties" xmlns:ns3="9ee2b467-fd2b-49f2-9b43-5897238b7b59" targetNamespace="http://schemas.microsoft.com/office/2006/metadata/properties" ma:root="true" ma:fieldsID="1a511fa1ada48a443d830dfa564ae23a" ns3:_="">
     <xsd:import namespace="9ee2b467-fd2b-49f2-9b43-5897238b7b59"/>
@@ -7988,24 +4553,31 @@
 </ct:contentTypeSchema>
 </file>
 
-<file path=customXml/item2.xml><?xml version="1.0" encoding="utf-8"?>
-<?mso-contentType ?>
-<FormTemplates xmlns="http://schemas.microsoft.com/sharepoint/v3/contenttype/forms">
-  <Display>DocumentLibraryForm</Display>
-  <Edit>DocumentLibraryForm</Edit>
-  <New>DocumentLibraryForm</New>
-</FormTemplates>
+<file path=customXml/itemProps1.xml><?xml version="1.0" encoding="utf-8"?>
+<ds:datastoreItem xmlns:ds="http://schemas.openxmlformats.org/officeDocument/2006/customXml" ds:itemID="{72FBE173-8BC2-4316-A91D-B9847EDAB47E}">
+  <ds:schemaRefs>
+    <ds:schemaRef ds:uri="http://schemas.microsoft.com/office/2006/documentManagement/types"/>
+    <ds:schemaRef ds:uri="http://schemas.microsoft.com/office/2006/metadata/properties"/>
+    <ds:schemaRef ds:uri="http://www.w3.org/XML/1998/namespace"/>
+    <ds:schemaRef ds:uri="9ee2b467-fd2b-49f2-9b43-5897238b7b59"/>
+    <ds:schemaRef ds:uri="http://purl.org/dc/dcmitype/"/>
+    <ds:schemaRef ds:uri="http://schemas.microsoft.com/office/infopath/2007/PartnerControls"/>
+    <ds:schemaRef ds:uri="http://schemas.openxmlformats.org/package/2006/metadata/core-properties"/>
+    <ds:schemaRef ds:uri="http://purl.org/dc/terms/"/>
+    <ds:schemaRef ds:uri="http://purl.org/dc/elements/1.1/"/>
+  </ds:schemaRefs>
+</ds:datastoreItem>
 </file>
 
-<file path=customXml/item3.xml><?xml version="1.0" encoding="utf-8"?>
-<p:properties xmlns:p="http://schemas.microsoft.com/office/2006/metadata/properties" xmlns:xsi="http://www.w3.org/2001/XMLSchema-instance" xmlns:pc="http://schemas.microsoft.com/office/infopath/2007/PartnerControls">
-  <documentManagement>
-    <_activity xmlns="9ee2b467-fd2b-49f2-9b43-5897238b7b59" xsi:nil="true"/>
-  </documentManagement>
-</p:properties>
+<file path=customXml/itemProps2.xml><?xml version="1.0" encoding="utf-8"?>
+<ds:datastoreItem xmlns:ds="http://schemas.openxmlformats.org/officeDocument/2006/customXml" ds:itemID="{A19C242D-5E01-4E73-A429-1ED326F2B0C6}">
+  <ds:schemaRefs>
+    <ds:schemaRef ds:uri="http://schemas.microsoft.com/sharepoint/v3/contenttype/forms"/>
+  </ds:schemaRefs>
+</ds:datastoreItem>
 </file>
 
-<file path=customXml/itemProps1.xml><?xml version="1.0" encoding="utf-8"?>
+<file path=customXml/itemProps3.xml><?xml version="1.0" encoding="utf-8"?>
 <ds:datastoreItem xmlns:ds="http://schemas.openxmlformats.org/officeDocument/2006/customXml" ds:itemID="{80EA40E1-24B3-4C2F-BE47-65DFADBA301E}">
   <ds:schemaRefs>
     <ds:schemaRef ds:uri="http://schemas.microsoft.com/office/2006/metadata/contentType"/>
@@ -8021,28 +4593,4 @@
     <ds:schemaRef ds:uri="http://schemas.microsoft.com/internal/obd"/>
   </ds:schemaRefs>
 </ds:datastoreItem>
-</file>
-
-<file path=customXml/itemProps2.xml><?xml version="1.0" encoding="utf-8"?>
-<ds:datastoreItem xmlns:ds="http://schemas.openxmlformats.org/officeDocument/2006/customXml" ds:itemID="{A19C242D-5E01-4E73-A429-1ED326F2B0C6}">
-  <ds:schemaRefs>
-    <ds:schemaRef ds:uri="http://schemas.microsoft.com/sharepoint/v3/contenttype/forms"/>
-  </ds:schemaRefs>
-</ds:datastoreItem>
-</file>
-
-<file path=customXml/itemProps3.xml><?xml version="1.0" encoding="utf-8"?>
-<ds:datastoreItem xmlns:ds="http://schemas.openxmlformats.org/officeDocument/2006/customXml" ds:itemID="{72FBE173-8BC2-4316-A91D-B9847EDAB47E}">
-  <ds:schemaRefs>
-    <ds:schemaRef ds:uri="http://purl.org/dc/terms/"/>
-    <ds:schemaRef ds:uri="http://schemas.microsoft.com/office/2006/documentManagement/types"/>
-    <ds:schemaRef ds:uri="http://schemas.openxmlformats.org/package/2006/metadata/core-properties"/>
-    <ds:schemaRef ds:uri="http://purl.org/dc/dcmitype/"/>
-    <ds:schemaRef ds:uri="http://schemas.microsoft.com/office/infopath/2007/PartnerControls"/>
-    <ds:schemaRef ds:uri="http://www.w3.org/XML/1998/namespace"/>
-    <ds:schemaRef ds:uri="9ee2b467-fd2b-49f2-9b43-5897238b7b59"/>
-    <ds:schemaRef ds:uri="http://schemas.microsoft.com/office/2006/metadata/properties"/>
-    <ds:schemaRef ds:uri="http://purl.org/dc/elements/1.1/"/>
-  </ds:schemaRefs>
-</ds:datastoreItem>
 </file>
</xml_diff>